<commit_message>
correction de la présentation
</commit_message>
<xml_diff>
--- a/Projet Heme Biotech.pptx
+++ b/Projet Heme Biotech.pptx
@@ -11,7 +11,9 @@
     <p:sldId id="262" r:id="rId8"/>
     <p:sldId id="259" r:id="rId9"/>
     <p:sldId id="260" r:id="rId10"/>
-    <p:sldId id="261" r:id="rId11"/>
+    <p:sldId id="264" r:id="rId11"/>
+    <p:sldId id="265" r:id="rId12"/>
+    <p:sldId id="266" r:id="rId13"/>
   </p:sldIdLst>
   <p:sldSz cx="12192000" cy="6858000"/>
   <p:notesSz cx="6858000" cy="9144000"/>
@@ -118,635 +120,6 @@
 </p:presentation>
 </file>
 
-<file path=ppt/changesInfos/changesInfo1.xml><?xml version="1.0" encoding="utf-8"?>
-<pc:chgInfo xmlns:a="http://schemas.openxmlformats.org/drawingml/2006/main" xmlns:r="http://schemas.openxmlformats.org/officeDocument/2006/relationships" xmlns:ac="http://schemas.microsoft.com/office/drawing/2013/main/command" xmlns:pc="http://schemas.microsoft.com/office/powerpoint/2013/main/command">
-  <pc:docChgLst>
-    <pc:chgData name="ALLEGAERT Ludovic" userId="750089ea-d026-49f6-a757-75033beacffa" providerId="ADAL" clId="{C2B26831-8401-4DD9-A546-221273584D5E}"/>
-    <pc:docChg chg="undo redo custSel addSld delSld modSld modMainMaster">
-      <pc:chgData name="ALLEGAERT Ludovic" userId="750089ea-d026-49f6-a757-75033beacffa" providerId="ADAL" clId="{C2B26831-8401-4DD9-A546-221273584D5E}" dt="2020-12-07T13:22:16.494" v="2726"/>
-      <pc:docMkLst>
-        <pc:docMk/>
-      </pc:docMkLst>
-      <pc:sldChg chg="addSp delSp modSp">
-        <pc:chgData name="ALLEGAERT Ludovic" userId="750089ea-d026-49f6-a757-75033beacffa" providerId="ADAL" clId="{C2B26831-8401-4DD9-A546-221273584D5E}" dt="2020-12-07T13:21:42.840" v="2719" actId="120"/>
-        <pc:sldMkLst>
-          <pc:docMk/>
-          <pc:sldMk cId="3467418686" sldId="256"/>
-        </pc:sldMkLst>
-        <pc:spChg chg="mod">
-          <ac:chgData name="ALLEGAERT Ludovic" userId="750089ea-d026-49f6-a757-75033beacffa" providerId="ADAL" clId="{C2B26831-8401-4DD9-A546-221273584D5E}" dt="2020-12-07T13:21:42.840" v="2719" actId="120"/>
-          <ac:spMkLst>
-            <pc:docMk/>
-            <pc:sldMk cId="3467418686" sldId="256"/>
-            <ac:spMk id="4" creationId="{885737C7-7CA3-4287-A0C2-AC3AE3138D1F}"/>
-          </ac:spMkLst>
-        </pc:spChg>
-        <pc:spChg chg="mod">
-          <ac:chgData name="ALLEGAERT Ludovic" userId="750089ea-d026-49f6-a757-75033beacffa" providerId="ADAL" clId="{C2B26831-8401-4DD9-A546-221273584D5E}" dt="2020-12-07T13:09:39.406" v="2577" actId="108"/>
-          <ac:spMkLst>
-            <pc:docMk/>
-            <pc:sldMk cId="3467418686" sldId="256"/>
-            <ac:spMk id="5" creationId="{C2C1A606-8C28-4E8C-82A6-EBDAF3491FFD}"/>
-          </ac:spMkLst>
-        </pc:spChg>
-        <pc:spChg chg="mod">
-          <ac:chgData name="ALLEGAERT Ludovic" userId="750089ea-d026-49f6-a757-75033beacffa" providerId="ADAL" clId="{C2B26831-8401-4DD9-A546-221273584D5E}" dt="2020-12-07T13:21:26.711" v="2716" actId="14100"/>
-          <ac:spMkLst>
-            <pc:docMk/>
-            <pc:sldMk cId="3467418686" sldId="256"/>
-            <ac:spMk id="6" creationId="{E6588C85-C481-4F49-8BE8-8C6C0DB13B22}"/>
-          </ac:spMkLst>
-        </pc:spChg>
-        <pc:picChg chg="add mod">
-          <ac:chgData name="ALLEGAERT Ludovic" userId="750089ea-d026-49f6-a757-75033beacffa" providerId="ADAL" clId="{C2B26831-8401-4DD9-A546-221273584D5E}" dt="2020-12-07T13:21:37.655" v="2718" actId="1076"/>
-          <ac:picMkLst>
-            <pc:docMk/>
-            <pc:sldMk cId="3467418686" sldId="256"/>
-            <ac:picMk id="2" creationId="{F29127CB-236F-4507-8B8F-2E9D8AFA47FA}"/>
-          </ac:picMkLst>
-        </pc:picChg>
-        <pc:picChg chg="add del">
-          <ac:chgData name="ALLEGAERT Ludovic" userId="750089ea-d026-49f6-a757-75033beacffa" providerId="ADAL" clId="{C2B26831-8401-4DD9-A546-221273584D5E}" dt="2020-12-07T13:20:20.306" v="2691"/>
-          <ac:picMkLst>
-            <pc:docMk/>
-            <pc:sldMk cId="3467418686" sldId="256"/>
-            <ac:picMk id="7" creationId="{E85D6B6E-FFF5-4FD4-9E2B-6004A68C9E5D}"/>
-          </ac:picMkLst>
-        </pc:picChg>
-      </pc:sldChg>
-      <pc:sldChg chg="addSp delSp modSp">
-        <pc:chgData name="ALLEGAERT Ludovic" userId="750089ea-d026-49f6-a757-75033beacffa" providerId="ADAL" clId="{C2B26831-8401-4DD9-A546-221273584D5E}" dt="2020-12-07T13:22:16.494" v="2726"/>
-        <pc:sldMkLst>
-          <pc:docMk/>
-          <pc:sldMk cId="580414251" sldId="257"/>
-        </pc:sldMkLst>
-        <pc:spChg chg="mod">
-          <ac:chgData name="ALLEGAERT Ludovic" userId="750089ea-d026-49f6-a757-75033beacffa" providerId="ADAL" clId="{C2B26831-8401-4DD9-A546-221273584D5E}" dt="2020-12-07T13:20:52.893" v="2706" actId="255"/>
-          <ac:spMkLst>
-            <pc:docMk/>
-            <pc:sldMk cId="580414251" sldId="257"/>
-            <ac:spMk id="5" creationId="{BC398C44-FE6B-4CEF-B1DC-2B801574714F}"/>
-          </ac:spMkLst>
-        </pc:spChg>
-        <pc:spChg chg="mod">
-          <ac:chgData name="ALLEGAERT Ludovic" userId="750089ea-d026-49f6-a757-75033beacffa" providerId="ADAL" clId="{C2B26831-8401-4DD9-A546-221273584D5E}" dt="2020-12-07T13:01:02.133" v="2497" actId="108"/>
-          <ac:spMkLst>
-            <pc:docMk/>
-            <pc:sldMk cId="580414251" sldId="257"/>
-            <ac:spMk id="6" creationId="{2E6A0BF2-3066-4645-A482-A46751DE2CB3}"/>
-          </ac:spMkLst>
-        </pc:spChg>
-        <pc:picChg chg="add del mod">
-          <ac:chgData name="ALLEGAERT Ludovic" userId="750089ea-d026-49f6-a757-75033beacffa" providerId="ADAL" clId="{C2B26831-8401-4DD9-A546-221273584D5E}" dt="2020-12-07T13:22:15.208" v="2725" actId="478"/>
-          <ac:picMkLst>
-            <pc:docMk/>
-            <pc:sldMk cId="580414251" sldId="257"/>
-            <ac:picMk id="4" creationId="{5759B1DF-0585-4258-B05C-D67B09F37043}"/>
-          </ac:picMkLst>
-        </pc:picChg>
-        <pc:picChg chg="add">
-          <ac:chgData name="ALLEGAERT Ludovic" userId="750089ea-d026-49f6-a757-75033beacffa" providerId="ADAL" clId="{C2B26831-8401-4DD9-A546-221273584D5E}" dt="2020-12-07T13:22:16.494" v="2726"/>
-          <ac:picMkLst>
-            <pc:docMk/>
-            <pc:sldMk cId="580414251" sldId="257"/>
-            <ac:picMk id="7" creationId="{C6A6F19B-0F04-4674-A369-27F6CBF17A5F}"/>
-          </ac:picMkLst>
-        </pc:picChg>
-      </pc:sldChg>
-      <pc:sldChg chg="addSp delSp modSp add setBg">
-        <pc:chgData name="ALLEGAERT Ludovic" userId="750089ea-d026-49f6-a757-75033beacffa" providerId="ADAL" clId="{C2B26831-8401-4DD9-A546-221273584D5E}" dt="2020-12-07T13:21:58.076" v="2720"/>
-        <pc:sldMkLst>
-          <pc:docMk/>
-          <pc:sldMk cId="3972800079" sldId="258"/>
-        </pc:sldMkLst>
-        <pc:spChg chg="mod">
-          <ac:chgData name="ALLEGAERT Ludovic" userId="750089ea-d026-49f6-a757-75033beacffa" providerId="ADAL" clId="{C2B26831-8401-4DD9-A546-221273584D5E}" dt="2020-12-07T09:22:02.295" v="378" actId="14100"/>
-          <ac:spMkLst>
-            <pc:docMk/>
-            <pc:sldMk cId="3972800079" sldId="258"/>
-            <ac:spMk id="2" creationId="{C2DC2B85-58D1-42AB-9271-46204E11AC28}"/>
-          </ac:spMkLst>
-        </pc:spChg>
-        <pc:spChg chg="mod">
-          <ac:chgData name="ALLEGAERT Ludovic" userId="750089ea-d026-49f6-a757-75033beacffa" providerId="ADAL" clId="{C2B26831-8401-4DD9-A546-221273584D5E}" dt="2020-12-07T13:10:27.665" v="2587" actId="20577"/>
-          <ac:spMkLst>
-            <pc:docMk/>
-            <pc:sldMk cId="3972800079" sldId="258"/>
-            <ac:spMk id="3" creationId="{9EBDE1F0-9023-489D-97C6-952BC21C4DD0}"/>
-          </ac:spMkLst>
-        </pc:spChg>
-        <pc:spChg chg="add del mod">
-          <ac:chgData name="ALLEGAERT Ludovic" userId="750089ea-d026-49f6-a757-75033beacffa" providerId="ADAL" clId="{C2B26831-8401-4DD9-A546-221273584D5E}" dt="2020-12-07T13:08:49.514" v="2569"/>
-          <ac:spMkLst>
-            <pc:docMk/>
-            <pc:sldMk cId="3972800079" sldId="258"/>
-            <ac:spMk id="4" creationId="{0C22283C-F777-4A85-A9A8-2E71E4F38880}"/>
-          </ac:spMkLst>
-        </pc:spChg>
-        <pc:spChg chg="add del mod">
-          <ac:chgData name="ALLEGAERT Ludovic" userId="750089ea-d026-49f6-a757-75033beacffa" providerId="ADAL" clId="{C2B26831-8401-4DD9-A546-221273584D5E}" dt="2020-12-07T09:18:58.263" v="337"/>
-          <ac:spMkLst>
-            <pc:docMk/>
-            <pc:sldMk cId="3972800079" sldId="258"/>
-            <ac:spMk id="5" creationId="{A9237029-DF33-4A2F-BFBE-E95E187074CE}"/>
-          </ac:spMkLst>
-        </pc:spChg>
-        <pc:spChg chg="add del">
-          <ac:chgData name="ALLEGAERT Ludovic" userId="750089ea-d026-49f6-a757-75033beacffa" providerId="ADAL" clId="{C2B26831-8401-4DD9-A546-221273584D5E}" dt="2020-12-07T09:18:58.263" v="337"/>
-          <ac:spMkLst>
-            <pc:docMk/>
-            <pc:sldMk cId="3972800079" sldId="258"/>
-            <ac:spMk id="6" creationId="{564E542E-0ABD-4F51-AB87-60BDEDFFCA61}"/>
-          </ac:spMkLst>
-        </pc:spChg>
-        <pc:spChg chg="add del">
-          <ac:chgData name="ALLEGAERT Ludovic" userId="750089ea-d026-49f6-a757-75033beacffa" providerId="ADAL" clId="{C2B26831-8401-4DD9-A546-221273584D5E}" dt="2020-12-07T09:18:58.263" v="337"/>
-          <ac:spMkLst>
-            <pc:docMk/>
-            <pc:sldMk cId="3972800079" sldId="258"/>
-            <ac:spMk id="7" creationId="{B460E46E-7BF2-43C8-A07B-6B94B386C8EE}"/>
-          </ac:spMkLst>
-        </pc:spChg>
-        <pc:spChg chg="add del mod">
-          <ac:chgData name="ALLEGAERT Ludovic" userId="750089ea-d026-49f6-a757-75033beacffa" providerId="ADAL" clId="{C2B26831-8401-4DD9-A546-221273584D5E}" dt="2020-12-07T09:21:10.056" v="369" actId="478"/>
-          <ac:spMkLst>
-            <pc:docMk/>
-            <pc:sldMk cId="3972800079" sldId="258"/>
-            <ac:spMk id="9" creationId="{2B657AAB-D18B-4FF6-B628-06315BA2EC97}"/>
-          </ac:spMkLst>
-        </pc:spChg>
-        <pc:spChg chg="add del">
-          <ac:chgData name="ALLEGAERT Ludovic" userId="750089ea-d026-49f6-a757-75033beacffa" providerId="ADAL" clId="{C2B26831-8401-4DD9-A546-221273584D5E}" dt="2020-12-07T09:21:09.538" v="368"/>
-          <ac:spMkLst>
-            <pc:docMk/>
-            <pc:sldMk cId="3972800079" sldId="258"/>
-            <ac:spMk id="10" creationId="{580E6257-0E3F-465C-AD12-3E6835B30462}"/>
-          </ac:spMkLst>
-        </pc:spChg>
-        <pc:picChg chg="add del mod">
-          <ac:chgData name="ALLEGAERT Ludovic" userId="750089ea-d026-49f6-a757-75033beacffa" providerId="ADAL" clId="{C2B26831-8401-4DD9-A546-221273584D5E}" dt="2020-12-07T12:48:50.741" v="2278" actId="478"/>
-          <ac:picMkLst>
-            <pc:docMk/>
-            <pc:sldMk cId="3972800079" sldId="258"/>
-            <ac:picMk id="11" creationId="{C12723EC-E8E9-47CD-BC01-82820C07CB93}"/>
-          </ac:picMkLst>
-        </pc:picChg>
-        <pc:picChg chg="add del">
-          <ac:chgData name="ALLEGAERT Ludovic" userId="750089ea-d026-49f6-a757-75033beacffa" providerId="ADAL" clId="{C2B26831-8401-4DD9-A546-221273584D5E}" dt="2020-12-07T13:19:05.555" v="2654" actId="478"/>
-          <ac:picMkLst>
-            <pc:docMk/>
-            <pc:sldMk cId="3972800079" sldId="258"/>
-            <ac:picMk id="12" creationId="{D2530E86-99FB-4C93-AACF-6C79321CEE4B}"/>
-          </ac:picMkLst>
-        </pc:picChg>
-        <pc:picChg chg="add">
-          <ac:chgData name="ALLEGAERT Ludovic" userId="750089ea-d026-49f6-a757-75033beacffa" providerId="ADAL" clId="{C2B26831-8401-4DD9-A546-221273584D5E}" dt="2020-12-07T13:21:58.076" v="2720"/>
-          <ac:picMkLst>
-            <pc:docMk/>
-            <pc:sldMk cId="3972800079" sldId="258"/>
-            <ac:picMk id="13" creationId="{F218ABF7-D66B-4187-9B10-1BA3A11322E7}"/>
-          </ac:picMkLst>
-        </pc:picChg>
-      </pc:sldChg>
-      <pc:sldChg chg="addSp delSp modSp add setBg">
-        <pc:chgData name="ALLEGAERT Ludovic" userId="750089ea-d026-49f6-a757-75033beacffa" providerId="ADAL" clId="{C2B26831-8401-4DD9-A546-221273584D5E}" dt="2020-12-07T13:22:00.712" v="2722"/>
-        <pc:sldMkLst>
-          <pc:docMk/>
-          <pc:sldMk cId="2151397754" sldId="259"/>
-        </pc:sldMkLst>
-        <pc:spChg chg="del">
-          <ac:chgData name="ALLEGAERT Ludovic" userId="750089ea-d026-49f6-a757-75033beacffa" providerId="ADAL" clId="{C2B26831-8401-4DD9-A546-221273584D5E}" dt="2020-12-07T09:45:29.670" v="687"/>
-          <ac:spMkLst>
-            <pc:docMk/>
-            <pc:sldMk cId="2151397754" sldId="259"/>
-            <ac:spMk id="2" creationId="{ADC1B6F3-6279-415E-8385-266B94C4AAF2}"/>
-          </ac:spMkLst>
-        </pc:spChg>
-        <pc:spChg chg="del">
-          <ac:chgData name="ALLEGAERT Ludovic" userId="750089ea-d026-49f6-a757-75033beacffa" providerId="ADAL" clId="{C2B26831-8401-4DD9-A546-221273584D5E}" dt="2020-12-07T09:45:29.670" v="687"/>
-          <ac:spMkLst>
-            <pc:docMk/>
-            <pc:sldMk cId="2151397754" sldId="259"/>
-            <ac:spMk id="3" creationId="{B2ACBE96-6D04-47FE-8C91-9E44DD39E245}"/>
-          </ac:spMkLst>
-        </pc:spChg>
-        <pc:spChg chg="del">
-          <ac:chgData name="ALLEGAERT Ludovic" userId="750089ea-d026-49f6-a757-75033beacffa" providerId="ADAL" clId="{C2B26831-8401-4DD9-A546-221273584D5E}" dt="2020-12-07T09:45:29.670" v="687"/>
-          <ac:spMkLst>
-            <pc:docMk/>
-            <pc:sldMk cId="2151397754" sldId="259"/>
-            <ac:spMk id="4" creationId="{0B26BCCC-D320-4F79-B85C-BC40BBE34C27}"/>
-          </ac:spMkLst>
-        </pc:spChg>
-        <pc:spChg chg="add del mod">
-          <ac:chgData name="ALLEGAERT Ludovic" userId="750089ea-d026-49f6-a757-75033beacffa" providerId="ADAL" clId="{C2B26831-8401-4DD9-A546-221273584D5E}" dt="2020-12-07T09:45:23.253" v="686"/>
-          <ac:spMkLst>
-            <pc:docMk/>
-            <pc:sldMk cId="2151397754" sldId="259"/>
-            <ac:spMk id="5" creationId="{375EE1BA-AA8E-4E0E-94B6-4062D3281779}"/>
-          </ac:spMkLst>
-        </pc:spChg>
-        <pc:spChg chg="add del">
-          <ac:chgData name="ALLEGAERT Ludovic" userId="750089ea-d026-49f6-a757-75033beacffa" providerId="ADAL" clId="{C2B26831-8401-4DD9-A546-221273584D5E}" dt="2020-12-07T09:45:23.253" v="686"/>
-          <ac:spMkLst>
-            <pc:docMk/>
-            <pc:sldMk cId="2151397754" sldId="259"/>
-            <ac:spMk id="6" creationId="{02FF5153-C429-4ED5-8A91-E59FCC131B53}"/>
-          </ac:spMkLst>
-        </pc:spChg>
-        <pc:spChg chg="add del">
-          <ac:chgData name="ALLEGAERT Ludovic" userId="750089ea-d026-49f6-a757-75033beacffa" providerId="ADAL" clId="{C2B26831-8401-4DD9-A546-221273584D5E}" dt="2020-12-07T09:45:23.253" v="686"/>
-          <ac:spMkLst>
-            <pc:docMk/>
-            <pc:sldMk cId="2151397754" sldId="259"/>
-            <ac:spMk id="7" creationId="{2ECBB9C7-1F96-48E4-A562-20CB92AC574A}"/>
-          </ac:spMkLst>
-        </pc:spChg>
-        <pc:spChg chg="add mod">
-          <ac:chgData name="ALLEGAERT Ludovic" userId="750089ea-d026-49f6-a757-75033beacffa" providerId="ADAL" clId="{C2B26831-8401-4DD9-A546-221273584D5E}" dt="2020-12-07T09:46:12.248" v="692" actId="255"/>
-          <ac:spMkLst>
-            <pc:docMk/>
-            <pc:sldMk cId="2151397754" sldId="259"/>
-            <ac:spMk id="9" creationId="{03690B80-3001-4254-B25A-CA05E11F66F4}"/>
-          </ac:spMkLst>
-        </pc:spChg>
-        <pc:spChg chg="add mod">
-          <ac:chgData name="ALLEGAERT Ludovic" userId="750089ea-d026-49f6-a757-75033beacffa" providerId="ADAL" clId="{C2B26831-8401-4DD9-A546-221273584D5E}" dt="2020-12-07T13:12:59.254" v="2604" actId="20577"/>
-          <ac:spMkLst>
-            <pc:docMk/>
-            <pc:sldMk cId="2151397754" sldId="259"/>
-            <ac:spMk id="10" creationId="{902B2897-732F-433E-8980-316A3CD0BB29}"/>
-          </ac:spMkLst>
-        </pc:spChg>
-        <pc:spChg chg="add mod">
-          <ac:chgData name="ALLEGAERT Ludovic" userId="750089ea-d026-49f6-a757-75033beacffa" providerId="ADAL" clId="{C2B26831-8401-4DD9-A546-221273584D5E}" dt="2020-12-07T13:08:59.517" v="2571"/>
-          <ac:spMkLst>
-            <pc:docMk/>
-            <pc:sldMk cId="2151397754" sldId="259"/>
-            <ac:spMk id="11" creationId="{272AB005-BE4B-4019-9574-583D76CFBF86}"/>
-          </ac:spMkLst>
-        </pc:spChg>
-        <pc:picChg chg="add del">
-          <ac:chgData name="ALLEGAERT Ludovic" userId="750089ea-d026-49f6-a757-75033beacffa" providerId="ADAL" clId="{C2B26831-8401-4DD9-A546-221273584D5E}" dt="2020-12-07T09:45:23.253" v="686"/>
-          <ac:picMkLst>
-            <pc:docMk/>
-            <pc:sldMk cId="2151397754" sldId="259"/>
-            <ac:picMk id="8" creationId="{B67704FB-D08D-4CD3-9366-12F730C27E7B}"/>
-          </ac:picMkLst>
-        </pc:picChg>
-        <pc:picChg chg="add del">
-          <ac:chgData name="ALLEGAERT Ludovic" userId="750089ea-d026-49f6-a757-75033beacffa" providerId="ADAL" clId="{C2B26831-8401-4DD9-A546-221273584D5E}" dt="2020-12-07T09:50:02.740" v="801" actId="478"/>
-          <ac:picMkLst>
-            <pc:docMk/>
-            <pc:sldMk cId="2151397754" sldId="259"/>
-            <ac:picMk id="12" creationId="{C8547058-DEF5-4875-AEA7-24577EF84D2F}"/>
-          </ac:picMkLst>
-        </pc:picChg>
-        <pc:picChg chg="add del mod">
-          <ac:chgData name="ALLEGAERT Ludovic" userId="750089ea-d026-49f6-a757-75033beacffa" providerId="ADAL" clId="{C2B26831-8401-4DD9-A546-221273584D5E}" dt="2020-12-07T10:28:44.160" v="1087" actId="478"/>
-          <ac:picMkLst>
-            <pc:docMk/>
-            <pc:sldMk cId="2151397754" sldId="259"/>
-            <ac:picMk id="13" creationId="{D6346594-C8A8-49A9-A394-2A42C6F0572C}"/>
-          </ac:picMkLst>
-        </pc:picChg>
-        <pc:picChg chg="add del mod">
-          <ac:chgData name="ALLEGAERT Ludovic" userId="750089ea-d026-49f6-a757-75033beacffa" providerId="ADAL" clId="{C2B26831-8401-4DD9-A546-221273584D5E}" dt="2020-12-07T13:19:09.459" v="2657" actId="478"/>
-          <ac:picMkLst>
-            <pc:docMk/>
-            <pc:sldMk cId="2151397754" sldId="259"/>
-            <ac:picMk id="14" creationId="{13B91B1C-2BFB-4080-992C-0A15DFE8349A}"/>
-          </ac:picMkLst>
-        </pc:picChg>
-        <pc:picChg chg="add">
-          <ac:chgData name="ALLEGAERT Ludovic" userId="750089ea-d026-49f6-a757-75033beacffa" providerId="ADAL" clId="{C2B26831-8401-4DD9-A546-221273584D5E}" dt="2020-12-07T13:22:00.712" v="2722"/>
-          <ac:picMkLst>
-            <pc:docMk/>
-            <pc:sldMk cId="2151397754" sldId="259"/>
-            <ac:picMk id="15" creationId="{600D2368-141D-42B3-A0A7-3B312CAF37CA}"/>
-          </ac:picMkLst>
-        </pc:picChg>
-      </pc:sldChg>
-      <pc:sldChg chg="addSp delSp modSp add setBg">
-        <pc:chgData name="ALLEGAERT Ludovic" userId="750089ea-d026-49f6-a757-75033beacffa" providerId="ADAL" clId="{C2B26831-8401-4DD9-A546-221273584D5E}" dt="2020-12-07T13:22:02.566" v="2723"/>
-        <pc:sldMkLst>
-          <pc:docMk/>
-          <pc:sldMk cId="1960653530" sldId="260"/>
-        </pc:sldMkLst>
-        <pc:spChg chg="add">
-          <ac:chgData name="ALLEGAERT Ludovic" userId="750089ea-d026-49f6-a757-75033beacffa" providerId="ADAL" clId="{C2B26831-8401-4DD9-A546-221273584D5E}" dt="2020-12-07T10:04:30.440" v="905"/>
-          <ac:spMkLst>
-            <pc:docMk/>
-            <pc:sldMk cId="1960653530" sldId="260"/>
-            <ac:spMk id="2" creationId="{325055A1-C696-4664-855B-6F22F2417683}"/>
-          </ac:spMkLst>
-        </pc:spChg>
-        <pc:spChg chg="add mod">
-          <ac:chgData name="ALLEGAERT Ludovic" userId="750089ea-d026-49f6-a757-75033beacffa" providerId="ADAL" clId="{C2B26831-8401-4DD9-A546-221273584D5E}" dt="2020-12-07T13:16:12.585" v="2626" actId="20577"/>
-          <ac:spMkLst>
-            <pc:docMk/>
-            <pc:sldMk cId="1960653530" sldId="260"/>
-            <ac:spMk id="3" creationId="{F430FB2F-C3CD-4908-B7C5-F72ADD5C26AC}"/>
-          </ac:spMkLst>
-        </pc:spChg>
-        <pc:spChg chg="add mod">
-          <ac:chgData name="ALLEGAERT Ludovic" userId="750089ea-d026-49f6-a757-75033beacffa" providerId="ADAL" clId="{C2B26831-8401-4DD9-A546-221273584D5E}" dt="2020-12-07T13:09:04.990" v="2572"/>
-          <ac:spMkLst>
-            <pc:docMk/>
-            <pc:sldMk cId="1960653530" sldId="260"/>
-            <ac:spMk id="4" creationId="{ABC898D1-4581-4B56-A950-57E44BE9E763}"/>
-          </ac:spMkLst>
-        </pc:spChg>
-        <pc:picChg chg="add del">
-          <ac:chgData name="ALLEGAERT Ludovic" userId="750089ea-d026-49f6-a757-75033beacffa" providerId="ADAL" clId="{C2B26831-8401-4DD9-A546-221273584D5E}" dt="2020-12-07T10:06:05.505" v="919" actId="478"/>
-          <ac:picMkLst>
-            <pc:docMk/>
-            <pc:sldMk cId="1960653530" sldId="260"/>
-            <ac:picMk id="5" creationId="{E1599F32-811B-42E2-95A6-3FAB58FB45E0}"/>
-          </ac:picMkLst>
-        </pc:picChg>
-        <pc:picChg chg="add mod">
-          <ac:chgData name="ALLEGAERT Ludovic" userId="750089ea-d026-49f6-a757-75033beacffa" providerId="ADAL" clId="{C2B26831-8401-4DD9-A546-221273584D5E}" dt="2020-12-07T10:26:51.602" v="1053" actId="1076"/>
-          <ac:picMkLst>
-            <pc:docMk/>
-            <pc:sldMk cId="1960653530" sldId="260"/>
-            <ac:picMk id="6" creationId="{F8F08115-5920-4EDD-89B7-9DB394D70A2F}"/>
-          </ac:picMkLst>
-        </pc:picChg>
-        <pc:picChg chg="add del">
-          <ac:chgData name="ALLEGAERT Ludovic" userId="750089ea-d026-49f6-a757-75033beacffa" providerId="ADAL" clId="{C2B26831-8401-4DD9-A546-221273584D5E}" dt="2020-12-07T13:19:12.562" v="2658" actId="478"/>
-          <ac:picMkLst>
-            <pc:docMk/>
-            <pc:sldMk cId="1960653530" sldId="260"/>
-            <ac:picMk id="7" creationId="{650BC775-8317-4A0F-880F-4EF251633DC3}"/>
-          </ac:picMkLst>
-        </pc:picChg>
-        <pc:picChg chg="add">
-          <ac:chgData name="ALLEGAERT Ludovic" userId="750089ea-d026-49f6-a757-75033beacffa" providerId="ADAL" clId="{C2B26831-8401-4DD9-A546-221273584D5E}" dt="2020-12-07T13:22:02.566" v="2723"/>
-          <ac:picMkLst>
-            <pc:docMk/>
-            <pc:sldMk cId="1960653530" sldId="260"/>
-            <ac:picMk id="8" creationId="{6BBF9D85-5CE9-4AE4-9FFC-5FACED79A147}"/>
-          </ac:picMkLst>
-        </pc:picChg>
-      </pc:sldChg>
-      <pc:sldChg chg="addSp delSp modSp add del">
-        <pc:chgData name="ALLEGAERT Ludovic" userId="750089ea-d026-49f6-a757-75033beacffa" providerId="ADAL" clId="{C2B26831-8401-4DD9-A546-221273584D5E}" dt="2020-12-07T13:22:04.314" v="2724"/>
-        <pc:sldMkLst>
-          <pc:docMk/>
-          <pc:sldMk cId="763155879" sldId="261"/>
-        </pc:sldMkLst>
-        <pc:spChg chg="mod">
-          <ac:chgData name="ALLEGAERT Ludovic" userId="750089ea-d026-49f6-a757-75033beacffa" providerId="ADAL" clId="{C2B26831-8401-4DD9-A546-221273584D5E}" dt="2020-12-07T13:17:15.411" v="2642" actId="20577"/>
-          <ac:spMkLst>
-            <pc:docMk/>
-            <pc:sldMk cId="763155879" sldId="261"/>
-            <ac:spMk id="3" creationId="{F430FB2F-C3CD-4908-B7C5-F72ADD5C26AC}"/>
-          </ac:spMkLst>
-        </pc:spChg>
-        <pc:spChg chg="mod">
-          <ac:chgData name="ALLEGAERT Ludovic" userId="750089ea-d026-49f6-a757-75033beacffa" providerId="ADAL" clId="{C2B26831-8401-4DD9-A546-221273584D5E}" dt="2020-12-07T13:09:11.660" v="2573"/>
-          <ac:spMkLst>
-            <pc:docMk/>
-            <pc:sldMk cId="763155879" sldId="261"/>
-            <ac:spMk id="4" creationId="{ABC898D1-4581-4B56-A950-57E44BE9E763}"/>
-          </ac:spMkLst>
-        </pc:spChg>
-        <pc:spChg chg="add mod">
-          <ac:chgData name="ALLEGAERT Ludovic" userId="750089ea-d026-49f6-a757-75033beacffa" providerId="ADAL" clId="{C2B26831-8401-4DD9-A546-221273584D5E}" dt="2020-12-07T12:12:37.676" v="1761" actId="1076"/>
-          <ac:spMkLst>
-            <pc:docMk/>
-            <pc:sldMk cId="763155879" sldId="261"/>
-            <ac:spMk id="18" creationId="{24C2C63E-2FD1-488D-8403-58DA2899E668}"/>
-          </ac:spMkLst>
-        </pc:spChg>
-        <pc:spChg chg="add mod">
-          <ac:chgData name="ALLEGAERT Ludovic" userId="750089ea-d026-49f6-a757-75033beacffa" providerId="ADAL" clId="{C2B26831-8401-4DD9-A546-221273584D5E}" dt="2020-12-07T12:12:20.505" v="1756" actId="1076"/>
-          <ac:spMkLst>
-            <pc:docMk/>
-            <pc:sldMk cId="763155879" sldId="261"/>
-            <ac:spMk id="19" creationId="{C7B32F7D-99DC-4962-9A00-7A0BE075A129}"/>
-          </ac:spMkLst>
-        </pc:spChg>
-        <pc:spChg chg="add mod">
-          <ac:chgData name="ALLEGAERT Ludovic" userId="750089ea-d026-49f6-a757-75033beacffa" providerId="ADAL" clId="{C2B26831-8401-4DD9-A546-221273584D5E}" dt="2020-12-07T12:12:33.764" v="1760" actId="1076"/>
-          <ac:spMkLst>
-            <pc:docMk/>
-            <pc:sldMk cId="763155879" sldId="261"/>
-            <ac:spMk id="20" creationId="{F170B54A-5E30-4B61-9D0F-0AD18C0BB9AE}"/>
-          </ac:spMkLst>
-        </pc:spChg>
-        <pc:spChg chg="add mod">
-          <ac:chgData name="ALLEGAERT Ludovic" userId="750089ea-d026-49f6-a757-75033beacffa" providerId="ADAL" clId="{C2B26831-8401-4DD9-A546-221273584D5E}" dt="2020-12-07T12:37:28.922" v="1804" actId="1076"/>
-          <ac:spMkLst>
-            <pc:docMk/>
-            <pc:sldMk cId="763155879" sldId="261"/>
-            <ac:spMk id="25" creationId="{3019B801-DE1D-4A9A-B900-7955888C449A}"/>
-          </ac:spMkLst>
-        </pc:spChg>
-        <pc:spChg chg="add mod">
-          <ac:chgData name="ALLEGAERT Ludovic" userId="750089ea-d026-49f6-a757-75033beacffa" providerId="ADAL" clId="{C2B26831-8401-4DD9-A546-221273584D5E}" dt="2020-12-07T12:38:01.753" v="1821" actId="6549"/>
-          <ac:spMkLst>
-            <pc:docMk/>
-            <pc:sldMk cId="763155879" sldId="261"/>
-            <ac:spMk id="26" creationId="{06610E60-A91D-4111-907E-3102591F4457}"/>
-          </ac:spMkLst>
-        </pc:spChg>
-        <pc:picChg chg="add del mod">
-          <ac:chgData name="ALLEGAERT Ludovic" userId="750089ea-d026-49f6-a757-75033beacffa" providerId="ADAL" clId="{C2B26831-8401-4DD9-A546-221273584D5E}" dt="2020-12-07T10:38:57.751" v="1271" actId="478"/>
-          <ac:picMkLst>
-            <pc:docMk/>
-            <pc:sldMk cId="763155879" sldId="261"/>
-            <ac:picMk id="5" creationId="{A358E542-9670-459D-A5CA-EA8D88D3CC88}"/>
-          </ac:picMkLst>
-        </pc:picChg>
-        <pc:picChg chg="del">
-          <ac:chgData name="ALLEGAERT Ludovic" userId="750089ea-d026-49f6-a757-75033beacffa" providerId="ADAL" clId="{C2B26831-8401-4DD9-A546-221273584D5E}" dt="2020-12-07T10:28:54.272" v="1093" actId="478"/>
-          <ac:picMkLst>
-            <pc:docMk/>
-            <pc:sldMk cId="763155879" sldId="261"/>
-            <ac:picMk id="6" creationId="{F8F08115-5920-4EDD-89B7-9DB394D70A2F}"/>
-          </ac:picMkLst>
-        </pc:picChg>
-        <pc:picChg chg="add del mod">
-          <ac:chgData name="ALLEGAERT Ludovic" userId="750089ea-d026-49f6-a757-75033beacffa" providerId="ADAL" clId="{C2B26831-8401-4DD9-A546-221273584D5E}" dt="2020-12-07T12:11:30.884" v="1744" actId="478"/>
-          <ac:picMkLst>
-            <pc:docMk/>
-            <pc:sldMk cId="763155879" sldId="261"/>
-            <ac:picMk id="11" creationId="{D7DA3476-21D4-416A-AEF5-693A41871A1B}"/>
-          </ac:picMkLst>
-        </pc:picChg>
-        <pc:picChg chg="add mod ord">
-          <ac:chgData name="ALLEGAERT Ludovic" userId="750089ea-d026-49f6-a757-75033beacffa" providerId="ADAL" clId="{C2B26831-8401-4DD9-A546-221273584D5E}" dt="2020-12-07T12:11:45.446" v="1747" actId="167"/>
-          <ac:picMkLst>
-            <pc:docMk/>
-            <pc:sldMk cId="763155879" sldId="261"/>
-            <ac:picMk id="24" creationId="{D48421FB-46F1-447C-986A-E149B35C36C1}"/>
-          </ac:picMkLst>
-        </pc:picChg>
-        <pc:picChg chg="add del">
-          <ac:chgData name="ALLEGAERT Ludovic" userId="750089ea-d026-49f6-a757-75033beacffa" providerId="ADAL" clId="{C2B26831-8401-4DD9-A546-221273584D5E}" dt="2020-12-07T13:19:15.048" v="2659" actId="478"/>
-          <ac:picMkLst>
-            <pc:docMk/>
-            <pc:sldMk cId="763155879" sldId="261"/>
-            <ac:picMk id="32" creationId="{D8221998-8242-4050-8A85-44DCBD288C9C}"/>
-          </ac:picMkLst>
-        </pc:picChg>
-        <pc:picChg chg="add">
-          <ac:chgData name="ALLEGAERT Ludovic" userId="750089ea-d026-49f6-a757-75033beacffa" providerId="ADAL" clId="{C2B26831-8401-4DD9-A546-221273584D5E}" dt="2020-12-07T13:22:04.314" v="2724"/>
-          <ac:picMkLst>
-            <pc:docMk/>
-            <pc:sldMk cId="763155879" sldId="261"/>
-            <ac:picMk id="33" creationId="{C6348409-ACF4-4AA2-A29D-B47BFC6DB4AE}"/>
-          </ac:picMkLst>
-        </pc:picChg>
-        <pc:cxnChg chg="add del mod">
-          <ac:chgData name="ALLEGAERT Ludovic" userId="750089ea-d026-49f6-a757-75033beacffa" providerId="ADAL" clId="{C2B26831-8401-4DD9-A546-221273584D5E}" dt="2020-12-07T10:39:01.312" v="1273" actId="478"/>
-          <ac:cxnSpMkLst>
-            <pc:docMk/>
-            <pc:sldMk cId="763155879" sldId="261"/>
-            <ac:cxnSpMk id="8" creationId="{D0ACB952-FE8E-48FC-94DF-7D615E961883}"/>
-          </ac:cxnSpMkLst>
-        </pc:cxnChg>
-        <pc:cxnChg chg="add del mod">
-          <ac:chgData name="ALLEGAERT Ludovic" userId="750089ea-d026-49f6-a757-75033beacffa" providerId="ADAL" clId="{C2B26831-8401-4DD9-A546-221273584D5E}" dt="2020-12-07T10:39:00.109" v="1272" actId="478"/>
-          <ac:cxnSpMkLst>
-            <pc:docMk/>
-            <pc:sldMk cId="763155879" sldId="261"/>
-            <ac:cxnSpMk id="10" creationId="{23E96949-8229-4DE3-804C-FBFA3C6263FE}"/>
-          </ac:cxnSpMkLst>
-        </pc:cxnChg>
-        <pc:cxnChg chg="add mod">
-          <ac:chgData name="ALLEGAERT Ludovic" userId="750089ea-d026-49f6-a757-75033beacffa" providerId="ADAL" clId="{C2B26831-8401-4DD9-A546-221273584D5E}" dt="2020-12-07T12:11:50.171" v="1748" actId="1076"/>
-          <ac:cxnSpMkLst>
-            <pc:docMk/>
-            <pc:sldMk cId="763155879" sldId="261"/>
-            <ac:cxnSpMk id="13" creationId="{6AB39C57-9C52-4724-AFF4-E2AF6F02F410}"/>
-          </ac:cxnSpMkLst>
-        </pc:cxnChg>
-        <pc:cxnChg chg="add mod">
-          <ac:chgData name="ALLEGAERT Ludovic" userId="750089ea-d026-49f6-a757-75033beacffa" providerId="ADAL" clId="{C2B26831-8401-4DD9-A546-221273584D5E}" dt="2020-12-07T12:12:00.362" v="1750" actId="1076"/>
-          <ac:cxnSpMkLst>
-            <pc:docMk/>
-            <pc:sldMk cId="763155879" sldId="261"/>
-            <ac:cxnSpMk id="15" creationId="{25A80376-4467-4A1D-A64D-BE38D979E7C7}"/>
-          </ac:cxnSpMkLst>
-        </pc:cxnChg>
-        <pc:cxnChg chg="add mod">
-          <ac:chgData name="ALLEGAERT Ludovic" userId="750089ea-d026-49f6-a757-75033beacffa" providerId="ADAL" clId="{C2B26831-8401-4DD9-A546-221273584D5E}" dt="2020-12-07T12:12:04.073" v="1751" actId="1076"/>
-          <ac:cxnSpMkLst>
-            <pc:docMk/>
-            <pc:sldMk cId="763155879" sldId="261"/>
-            <ac:cxnSpMk id="17" creationId="{09DA38BD-CDF6-41C2-AAE9-F5EFF24DC118}"/>
-          </ac:cxnSpMkLst>
-        </pc:cxnChg>
-        <pc:cxnChg chg="add del mod">
-          <ac:chgData name="ALLEGAERT Ludovic" userId="750089ea-d026-49f6-a757-75033beacffa" providerId="ADAL" clId="{C2B26831-8401-4DD9-A546-221273584D5E}" dt="2020-12-07T10:43:07.626" v="1317" actId="11529"/>
-          <ac:cxnSpMkLst>
-            <pc:docMk/>
-            <pc:sldMk cId="763155879" sldId="261"/>
-            <ac:cxnSpMk id="22" creationId="{8404CAA7-FF8D-463F-A52C-C62641BFE7BF}"/>
-          </ac:cxnSpMkLst>
-        </pc:cxnChg>
-        <pc:cxnChg chg="add mod">
-          <ac:chgData name="ALLEGAERT Ludovic" userId="750089ea-d026-49f6-a757-75033beacffa" providerId="ADAL" clId="{C2B26831-8401-4DD9-A546-221273584D5E}" dt="2020-12-07T12:38:50.689" v="1825" actId="1076"/>
-          <ac:cxnSpMkLst>
-            <pc:docMk/>
-            <pc:sldMk cId="763155879" sldId="261"/>
-            <ac:cxnSpMk id="28" creationId="{0AED8C8A-B880-4A1D-9880-C4E93A9512A2}"/>
-          </ac:cxnSpMkLst>
-        </pc:cxnChg>
-        <pc:cxnChg chg="add del mod">
-          <ac:chgData name="ALLEGAERT Ludovic" userId="750089ea-d026-49f6-a757-75033beacffa" providerId="ADAL" clId="{C2B26831-8401-4DD9-A546-221273584D5E}" dt="2020-12-07T12:38:55.408" v="1826" actId="478"/>
-          <ac:cxnSpMkLst>
-            <pc:docMk/>
-            <pc:sldMk cId="763155879" sldId="261"/>
-            <ac:cxnSpMk id="29" creationId="{414CC6F6-8D8D-466C-867C-75453D53FE6B}"/>
-          </ac:cxnSpMkLst>
-        </pc:cxnChg>
-        <pc:cxnChg chg="add mod">
-          <ac:chgData name="ALLEGAERT Ludovic" userId="750089ea-d026-49f6-a757-75033beacffa" providerId="ADAL" clId="{C2B26831-8401-4DD9-A546-221273584D5E}" dt="2020-12-07T12:39:13.693" v="1828" actId="1076"/>
-          <ac:cxnSpMkLst>
-            <pc:docMk/>
-            <pc:sldMk cId="763155879" sldId="261"/>
-            <ac:cxnSpMk id="31" creationId="{2428F968-5B81-4649-8DA6-274F994B0115}"/>
-          </ac:cxnSpMkLst>
-        </pc:cxnChg>
-      </pc:sldChg>
-      <pc:sldChg chg="add del">
-        <pc:chgData name="ALLEGAERT Ludovic" userId="750089ea-d026-49f6-a757-75033beacffa" providerId="ADAL" clId="{C2B26831-8401-4DD9-A546-221273584D5E}" dt="2020-12-07T12:42:24.107" v="1845" actId="2696"/>
-        <pc:sldMkLst>
-          <pc:docMk/>
-          <pc:sldMk cId="547344850" sldId="262"/>
-        </pc:sldMkLst>
-      </pc:sldChg>
-      <pc:sldChg chg="addSp delSp modSp add">
-        <pc:chgData name="ALLEGAERT Ludovic" userId="750089ea-d026-49f6-a757-75033beacffa" providerId="ADAL" clId="{C2B26831-8401-4DD9-A546-221273584D5E}" dt="2020-12-07T13:21:59.493" v="2721"/>
-        <pc:sldMkLst>
-          <pc:docMk/>
-          <pc:sldMk cId="2223569496" sldId="262"/>
-        </pc:sldMkLst>
-        <pc:spChg chg="mod">
-          <ac:chgData name="ALLEGAERT Ludovic" userId="750089ea-d026-49f6-a757-75033beacffa" providerId="ADAL" clId="{C2B26831-8401-4DD9-A546-221273584D5E}" dt="2020-12-07T12:55:56.721" v="2390" actId="20577"/>
-          <ac:spMkLst>
-            <pc:docMk/>
-            <pc:sldMk cId="2223569496" sldId="262"/>
-            <ac:spMk id="3" creationId="{9EBDE1F0-9023-489D-97C6-952BC21C4DD0}"/>
-          </ac:spMkLst>
-        </pc:spChg>
-        <pc:spChg chg="mod">
-          <ac:chgData name="ALLEGAERT Ludovic" userId="750089ea-d026-49f6-a757-75033beacffa" providerId="ADAL" clId="{C2B26831-8401-4DD9-A546-221273584D5E}" dt="2020-12-07T13:08:55.389" v="2570"/>
-          <ac:spMkLst>
-            <pc:docMk/>
-            <pc:sldMk cId="2223569496" sldId="262"/>
-            <ac:spMk id="4" creationId="{0C22283C-F777-4A85-A9A8-2E71E4F38880}"/>
-          </ac:spMkLst>
-        </pc:spChg>
-        <pc:picChg chg="add del">
-          <ac:chgData name="ALLEGAERT Ludovic" userId="750089ea-d026-49f6-a757-75033beacffa" providerId="ADAL" clId="{C2B26831-8401-4DD9-A546-221273584D5E}" dt="2020-12-07T13:19:07.635" v="2655" actId="478"/>
-          <ac:picMkLst>
-            <pc:docMk/>
-            <pc:sldMk cId="2223569496" sldId="262"/>
-            <ac:picMk id="6" creationId="{2B9D5369-CEE2-4DA4-B2AC-29EAFBE2BD7E}"/>
-          </ac:picMkLst>
-        </pc:picChg>
-        <pc:picChg chg="add">
-          <ac:chgData name="ALLEGAERT Ludovic" userId="750089ea-d026-49f6-a757-75033beacffa" providerId="ADAL" clId="{C2B26831-8401-4DD9-A546-221273584D5E}" dt="2020-12-07T13:21:59.493" v="2721"/>
-          <ac:picMkLst>
-            <pc:docMk/>
-            <pc:sldMk cId="2223569496" sldId="262"/>
-            <ac:picMk id="7" creationId="{96126B9F-49B3-439F-B48E-650587045249}"/>
-          </ac:picMkLst>
-        </pc:picChg>
-        <pc:picChg chg="mod">
-          <ac:chgData name="ALLEGAERT Ludovic" userId="750089ea-d026-49f6-a757-75033beacffa" providerId="ADAL" clId="{C2B26831-8401-4DD9-A546-221273584D5E}" dt="2020-12-07T12:51:51.839" v="2346" actId="1076"/>
-          <ac:picMkLst>
-            <pc:docMk/>
-            <pc:sldMk cId="2223569496" sldId="262"/>
-            <ac:picMk id="11" creationId="{C12723EC-E8E9-47CD-BC01-82820C07CB93}"/>
-          </ac:picMkLst>
-        </pc:picChg>
-      </pc:sldChg>
-      <pc:sldMasterChg chg="modSp">
-        <pc:chgData name="ALLEGAERT Ludovic" userId="750089ea-d026-49f6-a757-75033beacffa" providerId="ADAL" clId="{C2B26831-8401-4DD9-A546-221273584D5E}" dt="2020-12-07T12:54:55.753" v="2380"/>
-        <pc:sldMasterMkLst>
-          <pc:docMk/>
-          <pc:sldMasterMk cId="3521982772" sldId="2147483648"/>
-        </pc:sldMasterMkLst>
-        <pc:spChg chg="mod">
-          <ac:chgData name="ALLEGAERT Ludovic" userId="750089ea-d026-49f6-a757-75033beacffa" providerId="ADAL" clId="{C2B26831-8401-4DD9-A546-221273584D5E}" dt="2020-12-07T12:54:55.753" v="2380"/>
-          <ac:spMkLst>
-            <pc:docMk/>
-            <pc:sldMasterMk cId="3521982772" sldId="2147483648"/>
-            <ac:spMk id="7" creationId="{56C3A55A-BE3B-46C5-BA04-364A0A6A8F00}"/>
-          </ac:spMkLst>
-        </pc:spChg>
-      </pc:sldMasterChg>
-    </pc:docChg>
-  </pc:docChgLst>
-</pc:chgInfo>
-</file>
-
 <file path=ppt/slideLayouts/slideLayout1.xml><?xml version="1.0" encoding="utf-8"?>
 <p:sldLayout xmlns:a="http://schemas.openxmlformats.org/drawingml/2006/main" xmlns:r="http://schemas.openxmlformats.org/officeDocument/2006/relationships" xmlns:p="http://schemas.openxmlformats.org/presentationml/2006/main" type="title" preserve="1">
   <p:cSld name="Diapositive de titre">
@@ -894,7 +267,7 @@
           <a:p>
             <a:fld id="{7070E058-B253-4EC0-95A6-A373AE7302EF}" type="datetimeFigureOut">
               <a:rPr lang="fr-FR" smtClean="0"/>
-              <a:t>07/12/2020</a:t>
+              <a:t>11/12/2020</a:t>
             </a:fld>
             <a:endParaRPr lang="fr-FR"/>
           </a:p>
@@ -1092,7 +465,7 @@
           <a:p>
             <a:fld id="{7070E058-B253-4EC0-95A6-A373AE7302EF}" type="datetimeFigureOut">
               <a:rPr lang="fr-FR" smtClean="0"/>
-              <a:t>07/12/2020</a:t>
+              <a:t>11/12/2020</a:t>
             </a:fld>
             <a:endParaRPr lang="fr-FR"/>
           </a:p>
@@ -1300,7 +673,7 @@
           <a:p>
             <a:fld id="{7070E058-B253-4EC0-95A6-A373AE7302EF}" type="datetimeFigureOut">
               <a:rPr lang="fr-FR" smtClean="0"/>
-              <a:t>07/12/2020</a:t>
+              <a:t>11/12/2020</a:t>
             </a:fld>
             <a:endParaRPr lang="fr-FR"/>
           </a:p>
@@ -1498,7 +871,7 @@
           <a:p>
             <a:fld id="{7070E058-B253-4EC0-95A6-A373AE7302EF}" type="datetimeFigureOut">
               <a:rPr lang="fr-FR" smtClean="0"/>
-              <a:t>07/12/2020</a:t>
+              <a:t>11/12/2020</a:t>
             </a:fld>
             <a:endParaRPr lang="fr-FR"/>
           </a:p>
@@ -1773,7 +1146,7 @@
           <a:p>
             <a:fld id="{7070E058-B253-4EC0-95A6-A373AE7302EF}" type="datetimeFigureOut">
               <a:rPr lang="fr-FR" smtClean="0"/>
-              <a:t>07/12/2020</a:t>
+              <a:t>11/12/2020</a:t>
             </a:fld>
             <a:endParaRPr lang="fr-FR"/>
           </a:p>
@@ -2038,7 +1411,7 @@
           <a:p>
             <a:fld id="{7070E058-B253-4EC0-95A6-A373AE7302EF}" type="datetimeFigureOut">
               <a:rPr lang="fr-FR" smtClean="0"/>
-              <a:t>07/12/2020</a:t>
+              <a:t>11/12/2020</a:t>
             </a:fld>
             <a:endParaRPr lang="fr-FR"/>
           </a:p>
@@ -2450,7 +1823,7 @@
           <a:p>
             <a:fld id="{7070E058-B253-4EC0-95A6-A373AE7302EF}" type="datetimeFigureOut">
               <a:rPr lang="fr-FR" smtClean="0"/>
-              <a:t>07/12/2020</a:t>
+              <a:t>11/12/2020</a:t>
             </a:fld>
             <a:endParaRPr lang="fr-FR"/>
           </a:p>
@@ -2591,7 +1964,7 @@
           <a:p>
             <a:fld id="{7070E058-B253-4EC0-95A6-A373AE7302EF}" type="datetimeFigureOut">
               <a:rPr lang="fr-FR" smtClean="0"/>
-              <a:t>07/12/2020</a:t>
+              <a:t>11/12/2020</a:t>
             </a:fld>
             <a:endParaRPr lang="fr-FR"/>
           </a:p>
@@ -2704,7 +2077,7 @@
           <a:p>
             <a:fld id="{7070E058-B253-4EC0-95A6-A373AE7302EF}" type="datetimeFigureOut">
               <a:rPr lang="fr-FR" smtClean="0"/>
-              <a:t>07/12/2020</a:t>
+              <a:t>11/12/2020</a:t>
             </a:fld>
             <a:endParaRPr lang="fr-FR"/>
           </a:p>
@@ -3015,7 +2388,7 @@
           <a:p>
             <a:fld id="{7070E058-B253-4EC0-95A6-A373AE7302EF}" type="datetimeFigureOut">
               <a:rPr lang="fr-FR" smtClean="0"/>
-              <a:t>07/12/2020</a:t>
+              <a:t>11/12/2020</a:t>
             </a:fld>
             <a:endParaRPr lang="fr-FR"/>
           </a:p>
@@ -3303,7 +2676,7 @@
           <a:p>
             <a:fld id="{7070E058-B253-4EC0-95A6-A373AE7302EF}" type="datetimeFigureOut">
               <a:rPr lang="fr-FR" smtClean="0"/>
-              <a:t>07/12/2020</a:t>
+              <a:t>11/12/2020</a:t>
             </a:fld>
             <a:endParaRPr lang="fr-FR"/>
           </a:p>
@@ -3544,7 +2917,7 @@
           <a:p>
             <a:fld id="{7070E058-B253-4EC0-95A6-A373AE7302EF}" type="datetimeFigureOut">
               <a:rPr lang="fr-FR" smtClean="0"/>
-              <a:t>07/12/2020</a:t>
+              <a:t>11/12/2020</a:t>
             </a:fld>
             <a:endParaRPr lang="fr-FR"/>
           </a:p>
@@ -3654,8 +3027,8 @@
         </p:nvSpPr>
         <p:spPr>
           <a:xfrm>
-            <a:off x="0" y="6495424"/>
-            <a:ext cx="1719930" cy="307777"/>
+            <a:off x="0" y="6440626"/>
+            <a:ext cx="1719930" cy="417374"/>
           </a:xfrm>
           <a:prstGeom prst="rect">
             <a:avLst/>
@@ -3677,33 +3050,21 @@
               </a:spcAft>
             </a:pPr>
             <a:r>
-              <a:rPr lang="fr-FR" sz="1000" dirty="0">
+              <a:rPr lang="fr-FR" sz="1000">
                 <a:solidFill>
                   <a:srgbClr val="000000"/>
                 </a:solidFill>
                 <a:latin typeface="Calibri" panose="020F0502020204030204" pitchFamily="34" charset="0"/>
               </a:rPr>
               <a:t>
- </a:t>
-            </a:r>
-            <a:r>
-              <a:rPr lang="fr-FR" sz="1000" dirty="0" err="1">
-                <a:solidFill>
-                  <a:srgbClr val="000000"/>
-                </a:solidFill>
-                <a:latin typeface="Calibri" panose="020F0502020204030204" pitchFamily="34" charset="0"/>
-              </a:rPr>
-              <a:t>ification</a:t>
-            </a:r>
-            <a:r>
-              <a:rPr lang="fr-FR" sz="1000" dirty="0">
-                <a:solidFill>
-                  <a:srgbClr val="000000"/>
-                </a:solidFill>
-                <a:latin typeface="Calibri" panose="020F0502020204030204" pitchFamily="34" charset="0"/>
-              </a:rPr>
-              <a:t> : Confidentiel </a:t>
-            </a:r>
+ Classification : Confidentiel </a:t>
+            </a:r>
+            <a:endParaRPr lang="fr-FR" sz="1000" dirty="0">
+              <a:solidFill>
+                <a:srgbClr val="000000"/>
+              </a:solidFill>
+              <a:latin typeface="Calibri" panose="020F0502020204030204" pitchFamily="34" charset="0"/>
+            </a:endParaRPr>
           </a:p>
         </p:txBody>
       </p:sp>
@@ -4432,7 +3793,7 @@
                   <a:schemeClr val="bg1"/>
                 </a:solidFill>
               </a:rPr>
-              <a:t>Il y a de nombreux commentaires inutiles.</a:t>
+              <a:t>Il y a des commentaires inutiles.</a:t>
             </a:r>
           </a:p>
           <a:p>
@@ -4442,7 +3803,7 @@
                   <a:schemeClr val="bg1"/>
                 </a:solidFill>
               </a:rPr>
-              <a:t>Le code n’est pas modulaire.</a:t>
+              <a:t>Le code est procédurale et pas orienté objet.</a:t>
             </a:r>
           </a:p>
           <a:p>
@@ -6682,7 +6043,7 @@
                   <a:schemeClr val="bg1"/>
                 </a:solidFill>
               </a:rPr>
-              <a:t>&lt;String, Integer&gt; associant les symptômes à leur nombre d'occurrences, elle écrit le résultat ligne par ligne. Cette class hérite de la class utilitaire </a:t>
+              <a:t>&lt;String, Integer&gt; associant les symptômes à leur nombre d'occurrences, elle écrit le résultat dans un fichier ligne par ligne. Cette class hérite de la class utilitaire </a:t>
             </a:r>
             <a:r>
               <a:rPr lang="fr-FR" sz="1400" dirty="0" err="1">
@@ -7088,10 +6449,10 @@
       </p:grpSpPr>
       <p:pic>
         <p:nvPicPr>
-          <p:cNvPr id="24" name="Image 23">
-            <a:extLst>
-              <a:ext uri="{FF2B5EF4-FFF2-40B4-BE49-F238E27FC236}">
-                <a16:creationId xmlns:a16="http://schemas.microsoft.com/office/drawing/2014/main" id="{D48421FB-46F1-447C-986A-E149B35C36C1}"/>
+          <p:cNvPr id="7" name="Image 6">
+            <a:extLst>
+              <a:ext uri="{FF2B5EF4-FFF2-40B4-BE49-F238E27FC236}">
+                <a16:creationId xmlns:a16="http://schemas.microsoft.com/office/drawing/2014/main" id="{A54D9F7D-37AE-4189-B24A-F542616411C4}"/>
               </a:ext>
             </a:extLst>
           </p:cNvPr>
@@ -7108,8 +6469,8 @@
         </p:blipFill>
         <p:spPr>
           <a:xfrm>
-            <a:off x="4385829" y="2245848"/>
-            <a:ext cx="6505575" cy="2609850"/>
+            <a:off x="4528704" y="2257422"/>
+            <a:ext cx="6219825" cy="2505075"/>
           </a:xfrm>
           <a:prstGeom prst="rect">
             <a:avLst/>
@@ -7185,10 +6546,10 @@
       </p:sp>
       <p:sp>
         <p:nvSpPr>
-          <p:cNvPr id="3" name="Espace réservé du contenu 2">
-            <a:extLst>
-              <a:ext uri="{FF2B5EF4-FFF2-40B4-BE49-F238E27FC236}">
-                <a16:creationId xmlns:a16="http://schemas.microsoft.com/office/drawing/2014/main" id="{F430FB2F-C3CD-4908-B7C5-F72ADD5C26AC}"/>
+          <p:cNvPr id="4" name="Espace réservé du texte 3">
+            <a:extLst>
+              <a:ext uri="{FF2B5EF4-FFF2-40B4-BE49-F238E27FC236}">
+                <a16:creationId xmlns:a16="http://schemas.microsoft.com/office/drawing/2014/main" id="{ABC898D1-4581-4B56-A950-57E44BE9E763}"/>
               </a:ext>
             </a:extLst>
           </p:cNvPr>
@@ -7199,17 +6560,15 @@
         </p:nvSpPr>
         <p:spPr>
           <a:xfrm>
-            <a:off x="3921845" y="476459"/>
-            <a:ext cx="7430369" cy="6148628"/>
+            <a:off x="839788" y="996950"/>
+            <a:ext cx="3085231" cy="4872038"/>
           </a:xfrm>
           <a:prstGeom prst="rect">
             <a:avLst/>
           </a:prstGeom>
         </p:spPr>
         <p:txBody>
-          <a:bodyPr>
-            <a:normAutofit/>
-          </a:bodyPr>
+          <a:bodyPr/>
           <a:lstStyle>
             <a:lvl1pPr marL="228600" indent="-228600" algn="l" defTabSz="914400" rtl="0" eaLnBrk="1" latinLnBrk="0" hangingPunct="1">
               <a:lnSpc>
@@ -7375,454 +6734,6 @@
             </a:lvl9pPr>
           </a:lstStyle>
           <a:p>
-            <a:pPr marL="0" indent="0">
-              <a:buNone/>
-            </a:pPr>
-            <a:r>
-              <a:rPr lang="fr-FR" sz="2400" b="1" dirty="0">
-                <a:solidFill>
-                  <a:schemeClr val="bg1"/>
-                </a:solidFill>
-              </a:rPr>
-              <a:t>Mise en place de la solution :</a:t>
-            </a:r>
-          </a:p>
-          <a:p>
-            <a:r>
-              <a:rPr lang="fr-FR" sz="1800" dirty="0">
-                <a:solidFill>
-                  <a:schemeClr val="bg1"/>
-                </a:solidFill>
-              </a:rPr>
-              <a:t>Les Trois parties évoqués précédemment son appelées les unes après les autres dans la class principale: Analytics.</a:t>
-            </a:r>
-          </a:p>
-          <a:p>
-            <a:pPr marL="457200" lvl="1" indent="0">
-              <a:buNone/>
-            </a:pPr>
-            <a:endParaRPr lang="fr-FR" sz="1400" dirty="0">
-              <a:solidFill>
-                <a:schemeClr val="bg1"/>
-              </a:solidFill>
-            </a:endParaRPr>
-          </a:p>
-          <a:p>
-            <a:pPr marL="457200" lvl="1" indent="0">
-              <a:buNone/>
-            </a:pPr>
-            <a:r>
-              <a:rPr lang="fr-FR" sz="1400" dirty="0">
-                <a:solidFill>
-                  <a:schemeClr val="bg1"/>
-                </a:solidFill>
-              </a:rPr>
-              <a:t>Schéma de la solution :</a:t>
-            </a:r>
-          </a:p>
-          <a:p>
-            <a:pPr lvl="1"/>
-            <a:endParaRPr lang="fr-FR" sz="1400" dirty="0">
-              <a:solidFill>
-                <a:schemeClr val="bg1"/>
-              </a:solidFill>
-            </a:endParaRPr>
-          </a:p>
-          <a:p>
-            <a:pPr lvl="1"/>
-            <a:endParaRPr lang="fr-FR" sz="1400" dirty="0">
-              <a:solidFill>
-                <a:schemeClr val="bg1"/>
-              </a:solidFill>
-            </a:endParaRPr>
-          </a:p>
-          <a:p>
-            <a:pPr lvl="1"/>
-            <a:endParaRPr lang="fr-FR" sz="1400" dirty="0">
-              <a:solidFill>
-                <a:schemeClr val="bg1"/>
-              </a:solidFill>
-            </a:endParaRPr>
-          </a:p>
-          <a:p>
-            <a:pPr lvl="1"/>
-            <a:endParaRPr lang="fr-FR" sz="1400" dirty="0">
-              <a:solidFill>
-                <a:schemeClr val="bg1"/>
-              </a:solidFill>
-            </a:endParaRPr>
-          </a:p>
-          <a:p>
-            <a:pPr lvl="1"/>
-            <a:endParaRPr lang="fr-FR" sz="1400" dirty="0">
-              <a:solidFill>
-                <a:schemeClr val="bg1"/>
-              </a:solidFill>
-            </a:endParaRPr>
-          </a:p>
-          <a:p>
-            <a:pPr lvl="1"/>
-            <a:endParaRPr lang="fr-FR" sz="1400" dirty="0">
-              <a:solidFill>
-                <a:schemeClr val="bg1"/>
-              </a:solidFill>
-            </a:endParaRPr>
-          </a:p>
-          <a:p>
-            <a:pPr lvl="1"/>
-            <a:endParaRPr lang="fr-FR" sz="1400" dirty="0">
-              <a:solidFill>
-                <a:schemeClr val="bg1"/>
-              </a:solidFill>
-            </a:endParaRPr>
-          </a:p>
-          <a:p>
-            <a:pPr lvl="1"/>
-            <a:endParaRPr lang="fr-FR" sz="1400" dirty="0">
-              <a:solidFill>
-                <a:schemeClr val="bg1"/>
-              </a:solidFill>
-            </a:endParaRPr>
-          </a:p>
-          <a:p>
-            <a:pPr lvl="1"/>
-            <a:endParaRPr lang="fr-FR" sz="1400" dirty="0">
-              <a:solidFill>
-                <a:schemeClr val="bg1"/>
-              </a:solidFill>
-            </a:endParaRPr>
-          </a:p>
-          <a:p>
-            <a:pPr lvl="1"/>
-            <a:endParaRPr lang="fr-FR" sz="1400" dirty="0">
-              <a:solidFill>
-                <a:schemeClr val="bg1"/>
-              </a:solidFill>
-            </a:endParaRPr>
-          </a:p>
-          <a:p>
-            <a:pPr lvl="1"/>
-            <a:endParaRPr lang="fr-FR" sz="1400" dirty="0">
-              <a:solidFill>
-                <a:schemeClr val="bg1"/>
-              </a:solidFill>
-            </a:endParaRPr>
-          </a:p>
-          <a:p>
-            <a:pPr marL="457200" lvl="1" indent="0">
-              <a:buNone/>
-            </a:pPr>
-            <a:endParaRPr lang="fr-FR" sz="1400" dirty="0">
-              <a:solidFill>
-                <a:schemeClr val="bg1"/>
-              </a:solidFill>
-            </a:endParaRPr>
-          </a:p>
-          <a:p>
-            <a:pPr lvl="1"/>
-            <a:r>
-              <a:rPr lang="fr-FR" sz="1400" dirty="0">
-                <a:solidFill>
-                  <a:schemeClr val="bg1"/>
-                </a:solidFill>
-              </a:rPr>
-              <a:t>1) Appel de la class </a:t>
-            </a:r>
-            <a:r>
-              <a:rPr lang="fr-FR" sz="1400" dirty="0" err="1">
-                <a:solidFill>
-                  <a:schemeClr val="bg1"/>
-                </a:solidFill>
-              </a:rPr>
-              <a:t>ReadSymptomsFile</a:t>
-            </a:r>
-            <a:r>
-              <a:rPr lang="fr-FR" sz="1400" dirty="0">
-                <a:solidFill>
-                  <a:schemeClr val="bg1"/>
-                </a:solidFill>
-              </a:rPr>
-              <a:t> pour récupérer une List&lt;String&gt; de symptômes.</a:t>
-            </a:r>
-          </a:p>
-          <a:p>
-            <a:pPr lvl="1"/>
-            <a:r>
-              <a:rPr lang="fr-FR" sz="1400" dirty="0">
-                <a:solidFill>
-                  <a:schemeClr val="bg1"/>
-                </a:solidFill>
-              </a:rPr>
-              <a:t>2) Cette liste est envoyée à la class </a:t>
-            </a:r>
-            <a:r>
-              <a:rPr lang="fr-FR" sz="1400" dirty="0" err="1">
-                <a:solidFill>
-                  <a:schemeClr val="bg1"/>
-                </a:solidFill>
-              </a:rPr>
-              <a:t>CountSymptoms</a:t>
-            </a:r>
-            <a:r>
-              <a:rPr lang="fr-FR" sz="1400" dirty="0">
-                <a:solidFill>
-                  <a:schemeClr val="bg1"/>
-                </a:solidFill>
-              </a:rPr>
-              <a:t> pour compter les symptômes. Le résultat est récupéré dans une </a:t>
-            </a:r>
-            <a:r>
-              <a:rPr lang="fr-FR" sz="1400" dirty="0" err="1">
-                <a:solidFill>
-                  <a:schemeClr val="bg1"/>
-                </a:solidFill>
-              </a:rPr>
-              <a:t>Map</a:t>
-            </a:r>
-            <a:r>
-              <a:rPr lang="fr-FR" sz="1400" dirty="0">
-                <a:solidFill>
-                  <a:schemeClr val="bg1"/>
-                </a:solidFill>
-              </a:rPr>
-              <a:t> triée.</a:t>
-            </a:r>
-          </a:p>
-          <a:p>
-            <a:pPr lvl="1"/>
-            <a:r>
-              <a:rPr lang="fr-FR" sz="1400" dirty="0">
-                <a:solidFill>
-                  <a:schemeClr val="bg1"/>
-                </a:solidFill>
-              </a:rPr>
-              <a:t>3) La </a:t>
-            </a:r>
-            <a:r>
-              <a:rPr lang="fr-FR" sz="1400" dirty="0" err="1">
-                <a:solidFill>
-                  <a:schemeClr val="bg1"/>
-                </a:solidFill>
-              </a:rPr>
-              <a:t>Map</a:t>
-            </a:r>
-            <a:r>
-              <a:rPr lang="fr-FR" sz="1400" dirty="0">
-                <a:solidFill>
-                  <a:schemeClr val="bg1"/>
-                </a:solidFill>
-              </a:rPr>
-              <a:t> est envoyée à la class </a:t>
-            </a:r>
-            <a:r>
-              <a:rPr lang="fr-FR" sz="1400" dirty="0" err="1">
-                <a:solidFill>
-                  <a:schemeClr val="bg1"/>
-                </a:solidFill>
-              </a:rPr>
-              <a:t>WriteOutputFile</a:t>
-            </a:r>
-            <a:r>
-              <a:rPr lang="fr-FR" sz="1400" dirty="0">
-                <a:solidFill>
-                  <a:schemeClr val="bg1"/>
-                </a:solidFill>
-              </a:rPr>
-              <a:t> pour écrire le résultat.</a:t>
-            </a:r>
-          </a:p>
-        </p:txBody>
-      </p:sp>
-      <p:sp>
-        <p:nvSpPr>
-          <p:cNvPr id="4" name="Espace réservé du texte 3">
-            <a:extLst>
-              <a:ext uri="{FF2B5EF4-FFF2-40B4-BE49-F238E27FC236}">
-                <a16:creationId xmlns:a16="http://schemas.microsoft.com/office/drawing/2014/main" id="{ABC898D1-4581-4B56-A950-57E44BE9E763}"/>
-              </a:ext>
-            </a:extLst>
-          </p:cNvPr>
-          <p:cNvSpPr txBox="1">
-            <a:spLocks/>
-          </p:cNvSpPr>
-          <p:nvPr/>
-        </p:nvSpPr>
-        <p:spPr>
-          <a:xfrm>
-            <a:off x="839788" y="996950"/>
-            <a:ext cx="3085231" cy="4872038"/>
-          </a:xfrm>
-          <a:prstGeom prst="rect">
-            <a:avLst/>
-          </a:prstGeom>
-        </p:spPr>
-        <p:txBody>
-          <a:bodyPr/>
-          <a:lstStyle>
-            <a:lvl1pPr marL="228600" indent="-228600" algn="l" defTabSz="914400" rtl="0" eaLnBrk="1" latinLnBrk="0" hangingPunct="1">
-              <a:lnSpc>
-                <a:spcPct val="90000"/>
-              </a:lnSpc>
-              <a:spcBef>
-                <a:spcPts val="1000"/>
-              </a:spcBef>
-              <a:buFont typeface="Arial" panose="020B0604020202020204" pitchFamily="34" charset="0"/>
-              <a:buChar char="•"/>
-              <a:defRPr sz="2800" kern="1200">
-                <a:solidFill>
-                  <a:schemeClr val="tx1"/>
-                </a:solidFill>
-                <a:latin typeface="+mn-lt"/>
-                <a:ea typeface="+mn-ea"/>
-                <a:cs typeface="+mn-cs"/>
-              </a:defRPr>
-            </a:lvl1pPr>
-            <a:lvl2pPr marL="685800" indent="-228600" algn="l" defTabSz="914400" rtl="0" eaLnBrk="1" latinLnBrk="0" hangingPunct="1">
-              <a:lnSpc>
-                <a:spcPct val="90000"/>
-              </a:lnSpc>
-              <a:spcBef>
-                <a:spcPts val="500"/>
-              </a:spcBef>
-              <a:buFont typeface="Arial" panose="020B0604020202020204" pitchFamily="34" charset="0"/>
-              <a:buChar char="•"/>
-              <a:defRPr sz="2400" kern="1200">
-                <a:solidFill>
-                  <a:schemeClr val="tx1"/>
-                </a:solidFill>
-                <a:latin typeface="+mn-lt"/>
-                <a:ea typeface="+mn-ea"/>
-                <a:cs typeface="+mn-cs"/>
-              </a:defRPr>
-            </a:lvl2pPr>
-            <a:lvl3pPr marL="1143000" indent="-228600" algn="l" defTabSz="914400" rtl="0" eaLnBrk="1" latinLnBrk="0" hangingPunct="1">
-              <a:lnSpc>
-                <a:spcPct val="90000"/>
-              </a:lnSpc>
-              <a:spcBef>
-                <a:spcPts val="500"/>
-              </a:spcBef>
-              <a:buFont typeface="Arial" panose="020B0604020202020204" pitchFamily="34" charset="0"/>
-              <a:buChar char="•"/>
-              <a:defRPr sz="2000" kern="1200">
-                <a:solidFill>
-                  <a:schemeClr val="tx1"/>
-                </a:solidFill>
-                <a:latin typeface="+mn-lt"/>
-                <a:ea typeface="+mn-ea"/>
-                <a:cs typeface="+mn-cs"/>
-              </a:defRPr>
-            </a:lvl3pPr>
-            <a:lvl4pPr marL="1600200" indent="-228600" algn="l" defTabSz="914400" rtl="0" eaLnBrk="1" latinLnBrk="0" hangingPunct="1">
-              <a:lnSpc>
-                <a:spcPct val="90000"/>
-              </a:lnSpc>
-              <a:spcBef>
-                <a:spcPts val="500"/>
-              </a:spcBef>
-              <a:buFont typeface="Arial" panose="020B0604020202020204" pitchFamily="34" charset="0"/>
-              <a:buChar char="•"/>
-              <a:defRPr sz="1800" kern="1200">
-                <a:solidFill>
-                  <a:schemeClr val="tx1"/>
-                </a:solidFill>
-                <a:latin typeface="+mn-lt"/>
-                <a:ea typeface="+mn-ea"/>
-                <a:cs typeface="+mn-cs"/>
-              </a:defRPr>
-            </a:lvl4pPr>
-            <a:lvl5pPr marL="2057400" indent="-228600" algn="l" defTabSz="914400" rtl="0" eaLnBrk="1" latinLnBrk="0" hangingPunct="1">
-              <a:lnSpc>
-                <a:spcPct val="90000"/>
-              </a:lnSpc>
-              <a:spcBef>
-                <a:spcPts val="500"/>
-              </a:spcBef>
-              <a:buFont typeface="Arial" panose="020B0604020202020204" pitchFamily="34" charset="0"/>
-              <a:buChar char="•"/>
-              <a:defRPr sz="1800" kern="1200">
-                <a:solidFill>
-                  <a:schemeClr val="tx1"/>
-                </a:solidFill>
-                <a:latin typeface="+mn-lt"/>
-                <a:ea typeface="+mn-ea"/>
-                <a:cs typeface="+mn-cs"/>
-              </a:defRPr>
-            </a:lvl5pPr>
-            <a:lvl6pPr marL="2514600" indent="-228600" algn="l" defTabSz="914400" rtl="0" eaLnBrk="1" latinLnBrk="0" hangingPunct="1">
-              <a:lnSpc>
-                <a:spcPct val="90000"/>
-              </a:lnSpc>
-              <a:spcBef>
-                <a:spcPts val="500"/>
-              </a:spcBef>
-              <a:buFont typeface="Arial" panose="020B0604020202020204" pitchFamily="34" charset="0"/>
-              <a:buChar char="•"/>
-              <a:defRPr sz="1800" kern="1200">
-                <a:solidFill>
-                  <a:schemeClr val="tx1"/>
-                </a:solidFill>
-                <a:latin typeface="+mn-lt"/>
-                <a:ea typeface="+mn-ea"/>
-                <a:cs typeface="+mn-cs"/>
-              </a:defRPr>
-            </a:lvl6pPr>
-            <a:lvl7pPr marL="2971800" indent="-228600" algn="l" defTabSz="914400" rtl="0" eaLnBrk="1" latinLnBrk="0" hangingPunct="1">
-              <a:lnSpc>
-                <a:spcPct val="90000"/>
-              </a:lnSpc>
-              <a:spcBef>
-                <a:spcPts val="500"/>
-              </a:spcBef>
-              <a:buFont typeface="Arial" panose="020B0604020202020204" pitchFamily="34" charset="0"/>
-              <a:buChar char="•"/>
-              <a:defRPr sz="1800" kern="1200">
-                <a:solidFill>
-                  <a:schemeClr val="tx1"/>
-                </a:solidFill>
-                <a:latin typeface="+mn-lt"/>
-                <a:ea typeface="+mn-ea"/>
-                <a:cs typeface="+mn-cs"/>
-              </a:defRPr>
-            </a:lvl7pPr>
-            <a:lvl8pPr marL="3429000" indent="-228600" algn="l" defTabSz="914400" rtl="0" eaLnBrk="1" latinLnBrk="0" hangingPunct="1">
-              <a:lnSpc>
-                <a:spcPct val="90000"/>
-              </a:lnSpc>
-              <a:spcBef>
-                <a:spcPts val="500"/>
-              </a:spcBef>
-              <a:buFont typeface="Arial" panose="020B0604020202020204" pitchFamily="34" charset="0"/>
-              <a:buChar char="•"/>
-              <a:defRPr sz="1800" kern="1200">
-                <a:solidFill>
-                  <a:schemeClr val="tx1"/>
-                </a:solidFill>
-                <a:latin typeface="+mn-lt"/>
-                <a:ea typeface="+mn-ea"/>
-                <a:cs typeface="+mn-cs"/>
-              </a:defRPr>
-            </a:lvl8pPr>
-            <a:lvl9pPr marL="3886200" indent="-228600" algn="l" defTabSz="914400" rtl="0" eaLnBrk="1" latinLnBrk="0" hangingPunct="1">
-              <a:lnSpc>
-                <a:spcPct val="90000"/>
-              </a:lnSpc>
-              <a:spcBef>
-                <a:spcPts val="500"/>
-              </a:spcBef>
-              <a:buFont typeface="Arial" panose="020B0604020202020204" pitchFamily="34" charset="0"/>
-              <a:buChar char="•"/>
-              <a:defRPr sz="1800" kern="1200">
-                <a:solidFill>
-                  <a:schemeClr val="tx1"/>
-                </a:solidFill>
-                <a:latin typeface="+mn-lt"/>
-                <a:ea typeface="+mn-ea"/>
-                <a:cs typeface="+mn-cs"/>
-              </a:defRPr>
-            </a:lvl9pPr>
-          </a:lstStyle>
-          <a:p>
             <a:pPr marL="285750" indent="-285750">
               <a:buFontTx/>
               <a:buChar char="-"/>
@@ -7875,255 +6786,21 @@
           </a:p>
         </p:txBody>
       </p:sp>
-      <p:cxnSp>
-        <p:nvCxnSpPr>
-          <p:cNvPr id="13" name="Connecteur droit avec flèche 12">
-            <a:extLst>
-              <a:ext uri="{FF2B5EF4-FFF2-40B4-BE49-F238E27FC236}">
-                <a16:creationId xmlns:a16="http://schemas.microsoft.com/office/drawing/2014/main" id="{6AB39C57-9C52-4724-AFF4-E2AF6F02F410}"/>
-              </a:ext>
-            </a:extLst>
-          </p:cNvPr>
-          <p:cNvCxnSpPr/>
-          <p:nvPr/>
-        </p:nvCxnSpPr>
-        <p:spPr>
-          <a:xfrm flipH="1" flipV="1">
-            <a:off x="5570185" y="3536169"/>
-            <a:ext cx="1811547" cy="780691"/>
-          </a:xfrm>
-          <a:prstGeom prst="straightConnector1">
-            <a:avLst/>
-          </a:prstGeom>
-          <a:ln>
-            <a:tailEnd type="triangle"/>
-          </a:ln>
-        </p:spPr>
-        <p:style>
-          <a:lnRef idx="1">
-            <a:schemeClr val="accent1"/>
-          </a:lnRef>
-          <a:fillRef idx="0">
-            <a:schemeClr val="accent1"/>
-          </a:fillRef>
-          <a:effectRef idx="0">
-            <a:schemeClr val="accent1"/>
-          </a:effectRef>
-          <a:fontRef idx="minor">
-            <a:schemeClr val="tx1"/>
-          </a:fontRef>
-        </p:style>
-      </p:cxnSp>
-      <p:cxnSp>
-        <p:nvCxnSpPr>
-          <p:cNvPr id="15" name="Connecteur droit avec flèche 14">
-            <a:extLst>
-              <a:ext uri="{FF2B5EF4-FFF2-40B4-BE49-F238E27FC236}">
-                <a16:creationId xmlns:a16="http://schemas.microsoft.com/office/drawing/2014/main" id="{25A80376-4467-4A1D-A64D-BE38D979E7C7}"/>
-              </a:ext>
-            </a:extLst>
-          </p:cNvPr>
-          <p:cNvCxnSpPr/>
-          <p:nvPr/>
-        </p:nvCxnSpPr>
-        <p:spPr>
-          <a:xfrm flipV="1">
-            <a:off x="7637029" y="3536168"/>
-            <a:ext cx="0" cy="780691"/>
-          </a:xfrm>
-          <a:prstGeom prst="straightConnector1">
-            <a:avLst/>
-          </a:prstGeom>
-          <a:ln>
-            <a:tailEnd type="triangle"/>
-          </a:ln>
-        </p:spPr>
-        <p:style>
-          <a:lnRef idx="1">
-            <a:schemeClr val="accent1"/>
-          </a:lnRef>
-          <a:fillRef idx="0">
-            <a:schemeClr val="accent1"/>
-          </a:fillRef>
-          <a:effectRef idx="0">
-            <a:schemeClr val="accent1"/>
-          </a:effectRef>
-          <a:fontRef idx="minor">
-            <a:schemeClr val="tx1"/>
-          </a:fontRef>
-        </p:style>
-      </p:cxnSp>
-      <p:cxnSp>
-        <p:nvCxnSpPr>
-          <p:cNvPr id="17" name="Connecteur droit avec flèche 16">
-            <a:extLst>
-              <a:ext uri="{FF2B5EF4-FFF2-40B4-BE49-F238E27FC236}">
-                <a16:creationId xmlns:a16="http://schemas.microsoft.com/office/drawing/2014/main" id="{09DA38BD-CDF6-41C2-AAE9-F5EFF24DC118}"/>
-              </a:ext>
-            </a:extLst>
-          </p:cNvPr>
-          <p:cNvCxnSpPr/>
-          <p:nvPr/>
-        </p:nvCxnSpPr>
-        <p:spPr>
-          <a:xfrm flipV="1">
-            <a:off x="7878394" y="3536167"/>
-            <a:ext cx="1518249" cy="780691"/>
-          </a:xfrm>
-          <a:prstGeom prst="straightConnector1">
-            <a:avLst/>
-          </a:prstGeom>
-          <a:ln>
-            <a:tailEnd type="triangle"/>
-          </a:ln>
-        </p:spPr>
-        <p:style>
-          <a:lnRef idx="1">
-            <a:schemeClr val="accent1"/>
-          </a:lnRef>
-          <a:fillRef idx="0">
-            <a:schemeClr val="accent1"/>
-          </a:fillRef>
-          <a:effectRef idx="0">
-            <a:schemeClr val="accent1"/>
-          </a:effectRef>
-          <a:fontRef idx="minor">
-            <a:schemeClr val="tx1"/>
-          </a:fontRef>
-        </p:style>
-      </p:cxnSp>
-      <p:sp>
-        <p:nvSpPr>
-          <p:cNvPr id="18" name="ZoneTexte 17">
-            <a:extLst>
-              <a:ext uri="{FF2B5EF4-FFF2-40B4-BE49-F238E27FC236}">
-                <a16:creationId xmlns:a16="http://schemas.microsoft.com/office/drawing/2014/main" id="{24C2C63E-2FD1-488D-8403-58DA2899E668}"/>
-              </a:ext>
-            </a:extLst>
-          </p:cNvPr>
-          <p:cNvSpPr txBox="1"/>
+      <p:sp>
+        <p:nvSpPr>
+          <p:cNvPr id="25" name="Rectangle 24">
+            <a:extLst>
+              <a:ext uri="{FF2B5EF4-FFF2-40B4-BE49-F238E27FC236}">
+                <a16:creationId xmlns:a16="http://schemas.microsoft.com/office/drawing/2014/main" id="{3019B801-DE1D-4A9A-B900-7955888C449A}"/>
+              </a:ext>
+            </a:extLst>
+          </p:cNvPr>
+          <p:cNvSpPr/>
           <p:nvPr/>
         </p:nvSpPr>
         <p:spPr>
           <a:xfrm>
-            <a:off x="5900230" y="3754674"/>
-            <a:ext cx="267419" cy="261610"/>
-          </a:xfrm>
-          <a:prstGeom prst="rect">
-            <a:avLst/>
-          </a:prstGeom>
-          <a:noFill/>
-        </p:spPr>
-        <p:txBody>
-          <a:bodyPr wrap="square" rtlCol="0">
-            <a:spAutoFit/>
-          </a:bodyPr>
-          <a:lstStyle/>
-          <a:p>
-            <a:r>
-              <a:rPr lang="fr-FR" sz="1100" dirty="0">
-                <a:solidFill>
-                  <a:schemeClr val="bg1"/>
-                </a:solidFill>
-              </a:rPr>
-              <a:t>1</a:t>
-            </a:r>
-          </a:p>
-        </p:txBody>
-      </p:sp>
-      <p:sp>
-        <p:nvSpPr>
-          <p:cNvPr id="19" name="ZoneTexte 18">
-            <a:extLst>
-              <a:ext uri="{FF2B5EF4-FFF2-40B4-BE49-F238E27FC236}">
-                <a16:creationId xmlns:a16="http://schemas.microsoft.com/office/drawing/2014/main" id="{C7B32F7D-99DC-4962-9A00-7A0BE075A129}"/>
-              </a:ext>
-            </a:extLst>
-          </p:cNvPr>
-          <p:cNvSpPr txBox="1"/>
-          <p:nvPr/>
-        </p:nvSpPr>
-        <p:spPr>
-          <a:xfrm>
-            <a:off x="7250541" y="3743547"/>
-            <a:ext cx="197271" cy="261610"/>
-          </a:xfrm>
-          <a:prstGeom prst="rect">
-            <a:avLst/>
-          </a:prstGeom>
-          <a:noFill/>
-        </p:spPr>
-        <p:txBody>
-          <a:bodyPr wrap="square" rtlCol="0">
-            <a:spAutoFit/>
-          </a:bodyPr>
-          <a:lstStyle/>
-          <a:p>
-            <a:r>
-              <a:rPr lang="fr-FR" sz="1100" dirty="0">
-                <a:solidFill>
-                  <a:schemeClr val="bg1"/>
-                </a:solidFill>
-              </a:rPr>
-              <a:t>2</a:t>
-            </a:r>
-          </a:p>
-        </p:txBody>
-      </p:sp>
-      <p:sp>
-        <p:nvSpPr>
-          <p:cNvPr id="20" name="ZoneTexte 19">
-            <a:extLst>
-              <a:ext uri="{FF2B5EF4-FFF2-40B4-BE49-F238E27FC236}">
-                <a16:creationId xmlns:a16="http://schemas.microsoft.com/office/drawing/2014/main" id="{F170B54A-5E30-4B61-9D0F-0AD18C0BB9AE}"/>
-              </a:ext>
-            </a:extLst>
-          </p:cNvPr>
-          <p:cNvSpPr txBox="1"/>
-          <p:nvPr/>
-        </p:nvSpPr>
-        <p:spPr>
-          <a:xfrm>
-            <a:off x="9062088" y="3754674"/>
-            <a:ext cx="250423" cy="261610"/>
-          </a:xfrm>
-          <a:prstGeom prst="rect">
-            <a:avLst/>
-          </a:prstGeom>
-          <a:noFill/>
-        </p:spPr>
-        <p:txBody>
-          <a:bodyPr wrap="square" rtlCol="0">
-            <a:spAutoFit/>
-          </a:bodyPr>
-          <a:lstStyle/>
-          <a:p>
-            <a:r>
-              <a:rPr lang="fr-FR" sz="1100" dirty="0">
-                <a:solidFill>
-                  <a:schemeClr val="bg1"/>
-                </a:solidFill>
-              </a:rPr>
-              <a:t>3</a:t>
-            </a:r>
-          </a:p>
-        </p:txBody>
-      </p:sp>
-      <p:sp>
-        <p:nvSpPr>
-          <p:cNvPr id="25" name="Rectangle 24">
-            <a:extLst>
-              <a:ext uri="{FF2B5EF4-FFF2-40B4-BE49-F238E27FC236}">
-                <a16:creationId xmlns:a16="http://schemas.microsoft.com/office/drawing/2014/main" id="{3019B801-DE1D-4A9A-B900-7955888C449A}"/>
-              </a:ext>
-            </a:extLst>
-          </p:cNvPr>
-          <p:cNvSpPr/>
-          <p:nvPr/>
-        </p:nvSpPr>
-        <p:spPr>
-          <a:xfrm>
-            <a:off x="4567538" y="3989099"/>
+            <a:off x="9142934" y="4096450"/>
             <a:ext cx="1017917" cy="218507"/>
           </a:xfrm>
           <a:prstGeom prst="rect">
@@ -8172,7 +6849,7 @@
         </p:nvSpPr>
         <p:spPr>
           <a:xfrm>
-            <a:off x="9644160" y="3984147"/>
+            <a:off x="5353529" y="4096451"/>
             <a:ext cx="1017917" cy="218507"/>
           </a:xfrm>
           <a:prstGeom prst="rect">
@@ -8224,8 +6901,8 @@
         </p:nvCxnSpPr>
         <p:spPr>
           <a:xfrm flipH="1" flipV="1">
-            <a:off x="5068860" y="3513777"/>
-            <a:ext cx="1" cy="452932"/>
+            <a:off x="9418380" y="2728957"/>
+            <a:ext cx="1" cy="1363524"/>
           </a:xfrm>
           <a:prstGeom prst="straightConnector1">
             <a:avLst/>
@@ -8265,8 +6942,8 @@
         </p:nvCxnSpPr>
         <p:spPr>
           <a:xfrm>
-            <a:off x="10153118" y="3530684"/>
-            <a:ext cx="1" cy="447980"/>
+            <a:off x="6092523" y="2728957"/>
+            <a:ext cx="3477" cy="1367494"/>
           </a:xfrm>
           <a:prstGeom prst="straightConnector1">
             <a:avLst/>
@@ -8320,15 +6997,1193 @@
           </a:prstGeom>
         </p:spPr>
       </p:pic>
+      <p:sp>
+        <p:nvSpPr>
+          <p:cNvPr id="22" name="Espace réservé du contenu 2">
+            <a:extLst>
+              <a:ext uri="{FF2B5EF4-FFF2-40B4-BE49-F238E27FC236}">
+                <a16:creationId xmlns:a16="http://schemas.microsoft.com/office/drawing/2014/main" id="{762CF297-B1D3-4F6A-A9F8-3ADD1E38CEA5}"/>
+              </a:ext>
+            </a:extLst>
+          </p:cNvPr>
+          <p:cNvSpPr txBox="1">
+            <a:spLocks/>
+          </p:cNvSpPr>
+          <p:nvPr/>
+        </p:nvSpPr>
+        <p:spPr>
+          <a:xfrm>
+            <a:off x="3921845" y="476459"/>
+            <a:ext cx="7430369" cy="6148628"/>
+          </a:xfrm>
+          <a:prstGeom prst="rect">
+            <a:avLst/>
+          </a:prstGeom>
+        </p:spPr>
+        <p:txBody>
+          <a:bodyPr>
+            <a:normAutofit/>
+          </a:bodyPr>
+          <a:lstStyle>
+            <a:lvl1pPr marL="228600" indent="-228600" algn="l" defTabSz="914400" rtl="0" eaLnBrk="1" latinLnBrk="0" hangingPunct="1">
+              <a:lnSpc>
+                <a:spcPct val="90000"/>
+              </a:lnSpc>
+              <a:spcBef>
+                <a:spcPts val="1000"/>
+              </a:spcBef>
+              <a:buFont typeface="Arial" panose="020B0604020202020204" pitchFamily="34" charset="0"/>
+              <a:buChar char="•"/>
+              <a:defRPr sz="2800" kern="1200">
+                <a:solidFill>
+                  <a:schemeClr val="tx1"/>
+                </a:solidFill>
+                <a:latin typeface="+mn-lt"/>
+                <a:ea typeface="+mn-ea"/>
+                <a:cs typeface="+mn-cs"/>
+              </a:defRPr>
+            </a:lvl1pPr>
+            <a:lvl2pPr marL="685800" indent="-228600" algn="l" defTabSz="914400" rtl="0" eaLnBrk="1" latinLnBrk="0" hangingPunct="1">
+              <a:lnSpc>
+                <a:spcPct val="90000"/>
+              </a:lnSpc>
+              <a:spcBef>
+                <a:spcPts val="500"/>
+              </a:spcBef>
+              <a:buFont typeface="Arial" panose="020B0604020202020204" pitchFamily="34" charset="0"/>
+              <a:buChar char="•"/>
+              <a:defRPr sz="2400" kern="1200">
+                <a:solidFill>
+                  <a:schemeClr val="tx1"/>
+                </a:solidFill>
+                <a:latin typeface="+mn-lt"/>
+                <a:ea typeface="+mn-ea"/>
+                <a:cs typeface="+mn-cs"/>
+              </a:defRPr>
+            </a:lvl2pPr>
+            <a:lvl3pPr marL="1143000" indent="-228600" algn="l" defTabSz="914400" rtl="0" eaLnBrk="1" latinLnBrk="0" hangingPunct="1">
+              <a:lnSpc>
+                <a:spcPct val="90000"/>
+              </a:lnSpc>
+              <a:spcBef>
+                <a:spcPts val="500"/>
+              </a:spcBef>
+              <a:buFont typeface="Arial" panose="020B0604020202020204" pitchFamily="34" charset="0"/>
+              <a:buChar char="•"/>
+              <a:defRPr sz="2000" kern="1200">
+                <a:solidFill>
+                  <a:schemeClr val="tx1"/>
+                </a:solidFill>
+                <a:latin typeface="+mn-lt"/>
+                <a:ea typeface="+mn-ea"/>
+                <a:cs typeface="+mn-cs"/>
+              </a:defRPr>
+            </a:lvl3pPr>
+            <a:lvl4pPr marL="1600200" indent="-228600" algn="l" defTabSz="914400" rtl="0" eaLnBrk="1" latinLnBrk="0" hangingPunct="1">
+              <a:lnSpc>
+                <a:spcPct val="90000"/>
+              </a:lnSpc>
+              <a:spcBef>
+                <a:spcPts val="500"/>
+              </a:spcBef>
+              <a:buFont typeface="Arial" panose="020B0604020202020204" pitchFamily="34" charset="0"/>
+              <a:buChar char="•"/>
+              <a:defRPr sz="1800" kern="1200">
+                <a:solidFill>
+                  <a:schemeClr val="tx1"/>
+                </a:solidFill>
+                <a:latin typeface="+mn-lt"/>
+                <a:ea typeface="+mn-ea"/>
+                <a:cs typeface="+mn-cs"/>
+              </a:defRPr>
+            </a:lvl4pPr>
+            <a:lvl5pPr marL="2057400" indent="-228600" algn="l" defTabSz="914400" rtl="0" eaLnBrk="1" latinLnBrk="0" hangingPunct="1">
+              <a:lnSpc>
+                <a:spcPct val="90000"/>
+              </a:lnSpc>
+              <a:spcBef>
+                <a:spcPts val="500"/>
+              </a:spcBef>
+              <a:buFont typeface="Arial" panose="020B0604020202020204" pitchFamily="34" charset="0"/>
+              <a:buChar char="•"/>
+              <a:defRPr sz="1800" kern="1200">
+                <a:solidFill>
+                  <a:schemeClr val="tx1"/>
+                </a:solidFill>
+                <a:latin typeface="+mn-lt"/>
+                <a:ea typeface="+mn-ea"/>
+                <a:cs typeface="+mn-cs"/>
+              </a:defRPr>
+            </a:lvl5pPr>
+            <a:lvl6pPr marL="2514600" indent="-228600" algn="l" defTabSz="914400" rtl="0" eaLnBrk="1" latinLnBrk="0" hangingPunct="1">
+              <a:lnSpc>
+                <a:spcPct val="90000"/>
+              </a:lnSpc>
+              <a:spcBef>
+                <a:spcPts val="500"/>
+              </a:spcBef>
+              <a:buFont typeface="Arial" panose="020B0604020202020204" pitchFamily="34" charset="0"/>
+              <a:buChar char="•"/>
+              <a:defRPr sz="1800" kern="1200">
+                <a:solidFill>
+                  <a:schemeClr val="tx1"/>
+                </a:solidFill>
+                <a:latin typeface="+mn-lt"/>
+                <a:ea typeface="+mn-ea"/>
+                <a:cs typeface="+mn-cs"/>
+              </a:defRPr>
+            </a:lvl6pPr>
+            <a:lvl7pPr marL="2971800" indent="-228600" algn="l" defTabSz="914400" rtl="0" eaLnBrk="1" latinLnBrk="0" hangingPunct="1">
+              <a:lnSpc>
+                <a:spcPct val="90000"/>
+              </a:lnSpc>
+              <a:spcBef>
+                <a:spcPts val="500"/>
+              </a:spcBef>
+              <a:buFont typeface="Arial" panose="020B0604020202020204" pitchFamily="34" charset="0"/>
+              <a:buChar char="•"/>
+              <a:defRPr sz="1800" kern="1200">
+                <a:solidFill>
+                  <a:schemeClr val="tx1"/>
+                </a:solidFill>
+                <a:latin typeface="+mn-lt"/>
+                <a:ea typeface="+mn-ea"/>
+                <a:cs typeface="+mn-cs"/>
+              </a:defRPr>
+            </a:lvl7pPr>
+            <a:lvl8pPr marL="3429000" indent="-228600" algn="l" defTabSz="914400" rtl="0" eaLnBrk="1" latinLnBrk="0" hangingPunct="1">
+              <a:lnSpc>
+                <a:spcPct val="90000"/>
+              </a:lnSpc>
+              <a:spcBef>
+                <a:spcPts val="500"/>
+              </a:spcBef>
+              <a:buFont typeface="Arial" panose="020B0604020202020204" pitchFamily="34" charset="0"/>
+              <a:buChar char="•"/>
+              <a:defRPr sz="1800" kern="1200">
+                <a:solidFill>
+                  <a:schemeClr val="tx1"/>
+                </a:solidFill>
+                <a:latin typeface="+mn-lt"/>
+                <a:ea typeface="+mn-ea"/>
+                <a:cs typeface="+mn-cs"/>
+              </a:defRPr>
+            </a:lvl8pPr>
+            <a:lvl9pPr marL="3886200" indent="-228600" algn="l" defTabSz="914400" rtl="0" eaLnBrk="1" latinLnBrk="0" hangingPunct="1">
+              <a:lnSpc>
+                <a:spcPct val="90000"/>
+              </a:lnSpc>
+              <a:spcBef>
+                <a:spcPts val="500"/>
+              </a:spcBef>
+              <a:buFont typeface="Arial" panose="020B0604020202020204" pitchFamily="34" charset="0"/>
+              <a:buChar char="•"/>
+              <a:defRPr sz="1800" kern="1200">
+                <a:solidFill>
+                  <a:schemeClr val="tx1"/>
+                </a:solidFill>
+                <a:latin typeface="+mn-lt"/>
+                <a:ea typeface="+mn-ea"/>
+                <a:cs typeface="+mn-cs"/>
+              </a:defRPr>
+            </a:lvl9pPr>
+          </a:lstStyle>
+          <a:p>
+            <a:pPr marL="0" indent="0">
+              <a:buNone/>
+            </a:pPr>
+            <a:r>
+              <a:rPr lang="fr-FR" sz="2400" b="1" dirty="0">
+                <a:solidFill>
+                  <a:schemeClr val="bg1"/>
+                </a:solidFill>
+              </a:rPr>
+              <a:t>Mise en place de la solution :</a:t>
+            </a:r>
+          </a:p>
+          <a:p>
+            <a:r>
+              <a:rPr lang="fr-FR" sz="1800" dirty="0">
+                <a:solidFill>
+                  <a:schemeClr val="bg1"/>
+                </a:solidFill>
+              </a:rPr>
+              <a:t>Les Trois parties évoqués précédemment son appelées les unes après les autres dans la class principale: Analytics.</a:t>
+            </a:r>
+          </a:p>
+          <a:p>
+            <a:pPr marL="457200" lvl="1" indent="0">
+              <a:buNone/>
+            </a:pPr>
+            <a:endParaRPr lang="fr-FR" sz="1400" dirty="0">
+              <a:solidFill>
+                <a:schemeClr val="bg1"/>
+              </a:solidFill>
+            </a:endParaRPr>
+          </a:p>
+          <a:p>
+            <a:pPr marL="457200" lvl="1" indent="0">
+              <a:buNone/>
+            </a:pPr>
+            <a:r>
+              <a:rPr lang="fr-FR" sz="1400" dirty="0">
+                <a:solidFill>
+                  <a:schemeClr val="bg1"/>
+                </a:solidFill>
+              </a:rPr>
+              <a:t>Schéma de la solution :</a:t>
+            </a:r>
+          </a:p>
+          <a:p>
+            <a:pPr lvl="1"/>
+            <a:endParaRPr lang="fr-FR" sz="1400" dirty="0">
+              <a:solidFill>
+                <a:schemeClr val="bg1"/>
+              </a:solidFill>
+            </a:endParaRPr>
+          </a:p>
+          <a:p>
+            <a:pPr lvl="1"/>
+            <a:endParaRPr lang="fr-FR" sz="1400" dirty="0">
+              <a:solidFill>
+                <a:schemeClr val="bg1"/>
+              </a:solidFill>
+            </a:endParaRPr>
+          </a:p>
+          <a:p>
+            <a:pPr marL="457200" lvl="1" indent="0">
+              <a:buNone/>
+            </a:pPr>
+            <a:endParaRPr lang="fr-FR" sz="1400" dirty="0">
+              <a:solidFill>
+                <a:schemeClr val="bg1"/>
+              </a:solidFill>
+            </a:endParaRPr>
+          </a:p>
+          <a:p>
+            <a:pPr lvl="1"/>
+            <a:endParaRPr lang="fr-FR" sz="1400" dirty="0">
+              <a:solidFill>
+                <a:schemeClr val="bg1"/>
+              </a:solidFill>
+            </a:endParaRPr>
+          </a:p>
+          <a:p>
+            <a:pPr lvl="1"/>
+            <a:endParaRPr lang="fr-FR" sz="1400" dirty="0">
+              <a:solidFill>
+                <a:schemeClr val="bg1"/>
+              </a:solidFill>
+            </a:endParaRPr>
+          </a:p>
+          <a:p>
+            <a:pPr lvl="1"/>
+            <a:endParaRPr lang="fr-FR" sz="1400" dirty="0">
+              <a:solidFill>
+                <a:schemeClr val="bg1"/>
+              </a:solidFill>
+            </a:endParaRPr>
+          </a:p>
+          <a:p>
+            <a:pPr lvl="1"/>
+            <a:endParaRPr lang="fr-FR" sz="1400" dirty="0">
+              <a:solidFill>
+                <a:schemeClr val="bg1"/>
+              </a:solidFill>
+            </a:endParaRPr>
+          </a:p>
+          <a:p>
+            <a:pPr lvl="1"/>
+            <a:endParaRPr lang="fr-FR" sz="1400" dirty="0">
+              <a:solidFill>
+                <a:schemeClr val="bg1"/>
+              </a:solidFill>
+            </a:endParaRPr>
+          </a:p>
+          <a:p>
+            <a:pPr lvl="1"/>
+            <a:endParaRPr lang="fr-FR" sz="1400" dirty="0">
+              <a:solidFill>
+                <a:schemeClr val="bg1"/>
+              </a:solidFill>
+            </a:endParaRPr>
+          </a:p>
+          <a:p>
+            <a:pPr marL="457200" lvl="1" indent="0">
+              <a:buNone/>
+            </a:pPr>
+            <a:endParaRPr lang="fr-FR" sz="1400" dirty="0">
+              <a:solidFill>
+                <a:schemeClr val="bg1"/>
+              </a:solidFill>
+            </a:endParaRPr>
+          </a:p>
+          <a:p>
+            <a:pPr lvl="1"/>
+            <a:endParaRPr lang="fr-FR" sz="1400" dirty="0">
+              <a:solidFill>
+                <a:schemeClr val="bg1"/>
+              </a:solidFill>
+            </a:endParaRPr>
+          </a:p>
+          <a:p>
+            <a:pPr marL="457200" lvl="1" indent="0">
+              <a:buNone/>
+            </a:pPr>
+            <a:endParaRPr lang="fr-FR" sz="1400" dirty="0">
+              <a:solidFill>
+                <a:schemeClr val="bg1"/>
+              </a:solidFill>
+            </a:endParaRPr>
+          </a:p>
+          <a:p>
+            <a:pPr lvl="1"/>
+            <a:r>
+              <a:rPr lang="fr-FR" sz="1400" dirty="0">
+                <a:solidFill>
+                  <a:schemeClr val="bg1"/>
+                </a:solidFill>
+              </a:rPr>
+              <a:t>1) Appel de la class </a:t>
+            </a:r>
+            <a:r>
+              <a:rPr lang="fr-FR" sz="1400" dirty="0" err="1">
+                <a:solidFill>
+                  <a:schemeClr val="bg1"/>
+                </a:solidFill>
+              </a:rPr>
+              <a:t>ReadSymptomsFile</a:t>
+            </a:r>
+            <a:r>
+              <a:rPr lang="fr-FR" sz="1400" dirty="0">
+                <a:solidFill>
+                  <a:schemeClr val="bg1"/>
+                </a:solidFill>
+              </a:rPr>
+              <a:t> pour récupérer une List&lt;String&gt; de symptômes.</a:t>
+            </a:r>
+          </a:p>
+          <a:p>
+            <a:pPr lvl="1"/>
+            <a:r>
+              <a:rPr lang="fr-FR" sz="1400" dirty="0">
+                <a:solidFill>
+                  <a:schemeClr val="bg1"/>
+                </a:solidFill>
+              </a:rPr>
+              <a:t>2) Cette liste est envoyée à la class </a:t>
+            </a:r>
+            <a:r>
+              <a:rPr lang="fr-FR" sz="1400" dirty="0" err="1">
+                <a:solidFill>
+                  <a:schemeClr val="bg1"/>
+                </a:solidFill>
+              </a:rPr>
+              <a:t>CountSymptoms</a:t>
+            </a:r>
+            <a:r>
+              <a:rPr lang="fr-FR" sz="1400" dirty="0">
+                <a:solidFill>
+                  <a:schemeClr val="bg1"/>
+                </a:solidFill>
+              </a:rPr>
+              <a:t> pour compter les symptômes. Le résultat est récupéré dans une </a:t>
+            </a:r>
+            <a:r>
+              <a:rPr lang="fr-FR" sz="1400" dirty="0" err="1">
+                <a:solidFill>
+                  <a:schemeClr val="bg1"/>
+                </a:solidFill>
+              </a:rPr>
+              <a:t>Map</a:t>
+            </a:r>
+            <a:r>
+              <a:rPr lang="fr-FR" sz="1400" dirty="0">
+                <a:solidFill>
+                  <a:schemeClr val="bg1"/>
+                </a:solidFill>
+              </a:rPr>
+              <a:t> triée.</a:t>
+            </a:r>
+          </a:p>
+          <a:p>
+            <a:pPr lvl="1"/>
+            <a:r>
+              <a:rPr lang="fr-FR" sz="1400" dirty="0">
+                <a:solidFill>
+                  <a:schemeClr val="bg1"/>
+                </a:solidFill>
+              </a:rPr>
+              <a:t>3) La </a:t>
+            </a:r>
+            <a:r>
+              <a:rPr lang="fr-FR" sz="1400" dirty="0" err="1">
+                <a:solidFill>
+                  <a:schemeClr val="bg1"/>
+                </a:solidFill>
+              </a:rPr>
+              <a:t>Map</a:t>
+            </a:r>
+            <a:r>
+              <a:rPr lang="fr-FR" sz="1400" dirty="0">
+                <a:solidFill>
+                  <a:schemeClr val="bg1"/>
+                </a:solidFill>
+              </a:rPr>
+              <a:t> est envoyée à la class </a:t>
+            </a:r>
+            <a:r>
+              <a:rPr lang="fr-FR" sz="1400" dirty="0" err="1">
+                <a:solidFill>
+                  <a:schemeClr val="bg1"/>
+                </a:solidFill>
+              </a:rPr>
+              <a:t>WriteOutputFile</a:t>
+            </a:r>
+            <a:r>
+              <a:rPr lang="fr-FR" sz="1400" dirty="0">
+                <a:solidFill>
+                  <a:schemeClr val="bg1"/>
+                </a:solidFill>
+              </a:rPr>
+              <a:t> pour écrire le résultat.</a:t>
+            </a:r>
+          </a:p>
+        </p:txBody>
+      </p:sp>
+      <p:cxnSp>
+        <p:nvCxnSpPr>
+          <p:cNvPr id="34" name="Connecteur droit avec flèche 33">
+            <a:extLst>
+              <a:ext uri="{FF2B5EF4-FFF2-40B4-BE49-F238E27FC236}">
+                <a16:creationId xmlns:a16="http://schemas.microsoft.com/office/drawing/2014/main" id="{7FE5F061-59F5-4E83-941F-A3E997C71397}"/>
+              </a:ext>
+            </a:extLst>
+          </p:cNvPr>
+          <p:cNvCxnSpPr>
+            <a:cxnSpLocks/>
+          </p:cNvCxnSpPr>
+          <p:nvPr/>
+        </p:nvCxnSpPr>
+        <p:spPr>
+          <a:xfrm flipH="1" flipV="1">
+            <a:off x="6371447" y="3429001"/>
+            <a:ext cx="1280183" cy="815195"/>
+          </a:xfrm>
+          <a:prstGeom prst="straightConnector1">
+            <a:avLst/>
+          </a:prstGeom>
+          <a:ln>
+            <a:tailEnd type="triangle"/>
+          </a:ln>
+        </p:spPr>
+        <p:style>
+          <a:lnRef idx="1">
+            <a:schemeClr val="accent1"/>
+          </a:lnRef>
+          <a:fillRef idx="0">
+            <a:schemeClr val="accent1"/>
+          </a:fillRef>
+          <a:effectRef idx="0">
+            <a:schemeClr val="accent1"/>
+          </a:effectRef>
+          <a:fontRef idx="minor">
+            <a:schemeClr val="tx1"/>
+          </a:fontRef>
+        </p:style>
+      </p:cxnSp>
+      <p:cxnSp>
+        <p:nvCxnSpPr>
+          <p:cNvPr id="36" name="Connecteur droit avec flèche 35">
+            <a:extLst>
+              <a:ext uri="{FF2B5EF4-FFF2-40B4-BE49-F238E27FC236}">
+                <a16:creationId xmlns:a16="http://schemas.microsoft.com/office/drawing/2014/main" id="{C3519CF1-28FF-4047-8F7A-3FF2D995202A}"/>
+              </a:ext>
+            </a:extLst>
+          </p:cNvPr>
+          <p:cNvCxnSpPr>
+            <a:cxnSpLocks/>
+          </p:cNvCxnSpPr>
+          <p:nvPr/>
+        </p:nvCxnSpPr>
+        <p:spPr>
+          <a:xfrm flipV="1">
+            <a:off x="7841411" y="3429000"/>
+            <a:ext cx="0" cy="815197"/>
+          </a:xfrm>
+          <a:prstGeom prst="straightConnector1">
+            <a:avLst/>
+          </a:prstGeom>
+          <a:ln>
+            <a:tailEnd type="triangle"/>
+          </a:ln>
+        </p:spPr>
+        <p:style>
+          <a:lnRef idx="1">
+            <a:schemeClr val="accent1"/>
+          </a:lnRef>
+          <a:fillRef idx="0">
+            <a:schemeClr val="accent1"/>
+          </a:fillRef>
+          <a:effectRef idx="0">
+            <a:schemeClr val="accent1"/>
+          </a:effectRef>
+          <a:fontRef idx="minor">
+            <a:schemeClr val="tx1"/>
+          </a:fontRef>
+        </p:style>
+      </p:cxnSp>
+      <p:cxnSp>
+        <p:nvCxnSpPr>
+          <p:cNvPr id="39" name="Connecteur droit avec flèche 38">
+            <a:extLst>
+              <a:ext uri="{FF2B5EF4-FFF2-40B4-BE49-F238E27FC236}">
+                <a16:creationId xmlns:a16="http://schemas.microsoft.com/office/drawing/2014/main" id="{8630D5A7-C164-4307-9FAE-47CEFD419FDD}"/>
+              </a:ext>
+            </a:extLst>
+          </p:cNvPr>
+          <p:cNvCxnSpPr>
+            <a:cxnSpLocks/>
+          </p:cNvCxnSpPr>
+          <p:nvPr/>
+        </p:nvCxnSpPr>
+        <p:spPr>
+          <a:xfrm flipV="1">
+            <a:off x="8065698" y="3429001"/>
+            <a:ext cx="974785" cy="815195"/>
+          </a:xfrm>
+          <a:prstGeom prst="straightConnector1">
+            <a:avLst/>
+          </a:prstGeom>
+          <a:ln>
+            <a:tailEnd type="triangle"/>
+          </a:ln>
+        </p:spPr>
+        <p:style>
+          <a:lnRef idx="1">
+            <a:schemeClr val="accent1"/>
+          </a:lnRef>
+          <a:fillRef idx="0">
+            <a:schemeClr val="accent1"/>
+          </a:fillRef>
+          <a:effectRef idx="0">
+            <a:schemeClr val="accent1"/>
+          </a:effectRef>
+          <a:fontRef idx="minor">
+            <a:schemeClr val="tx1"/>
+          </a:fontRef>
+        </p:style>
+      </p:cxnSp>
     </p:spTree>
     <p:extLst>
       <p:ext uri="{BB962C8B-B14F-4D97-AF65-F5344CB8AC3E}">
-        <p14:creationId xmlns:p14="http://schemas.microsoft.com/office/powerpoint/2010/main" val="763155879"/>
+        <p14:creationId xmlns:p14="http://schemas.microsoft.com/office/powerpoint/2010/main" val="3284346183"/>
       </p:ext>
     </p:extLst>
   </p:cSld>
   <p:clrMapOvr>
     <a:overrideClrMapping bg1="lt1" tx1="dk1" bg2="lt2" tx2="dk2" accent1="accent1" accent2="accent2" accent3="accent3" accent4="accent4" accent5="accent5" accent6="accent6" hlink="hlink" folHlink="folHlink"/>
+  </p:clrMapOvr>
+</p:sld>
+</file>
+
+<file path=ppt/slides/slide8.xml><?xml version="1.0" encoding="utf-8"?>
+<p:sld xmlns:a="http://schemas.openxmlformats.org/drawingml/2006/main" xmlns:r="http://schemas.openxmlformats.org/officeDocument/2006/relationships" xmlns:p="http://schemas.openxmlformats.org/presentationml/2006/main">
+  <p:cSld>
+    <p:bg>
+      <p:bgPr>
+        <a:solidFill>
+          <a:srgbClr val="002060"/>
+        </a:solidFill>
+        <a:effectLst/>
+      </p:bgPr>
+    </p:bg>
+    <p:spTree>
+      <p:nvGrpSpPr>
+        <p:cNvPr id="1" name=""/>
+        <p:cNvGrpSpPr/>
+        <p:nvPr/>
+      </p:nvGrpSpPr>
+      <p:grpSpPr>
+        <a:xfrm>
+          <a:off x="0" y="0"/>
+          <a:ext cx="0" cy="0"/>
+          <a:chOff x="0" y="0"/>
+          <a:chExt cx="0" cy="0"/>
+        </a:xfrm>
+      </p:grpSpPr>
+      <p:sp>
+        <p:nvSpPr>
+          <p:cNvPr id="4" name="Titre 3">
+            <a:extLst>
+              <a:ext uri="{FF2B5EF4-FFF2-40B4-BE49-F238E27FC236}">
+                <a16:creationId xmlns:a16="http://schemas.microsoft.com/office/drawing/2014/main" id="{885737C7-7CA3-4287-A0C2-AC3AE3138D1F}"/>
+              </a:ext>
+            </a:extLst>
+          </p:cNvPr>
+          <p:cNvSpPr>
+            <a:spLocks noGrp="1"/>
+          </p:cNvSpPr>
+          <p:nvPr>
+            <p:ph type="title"/>
+          </p:nvPr>
+        </p:nvSpPr>
+        <p:spPr>
+          <a:xfrm>
+            <a:off x="839788" y="457200"/>
+            <a:ext cx="3932237" cy="439947"/>
+          </a:xfrm>
+        </p:spPr>
+        <p:txBody>
+          <a:bodyPr>
+            <a:normAutofit fontScale="90000"/>
+          </a:bodyPr>
+          <a:lstStyle/>
+          <a:p>
+            <a:r>
+              <a:rPr lang="fr-FR" dirty="0">
+                <a:solidFill>
+                  <a:schemeClr val="bg1"/>
+                </a:solidFill>
+              </a:rPr>
+              <a:t>HEME Biotech</a:t>
+            </a:r>
+          </a:p>
+        </p:txBody>
+      </p:sp>
+      <p:sp>
+        <p:nvSpPr>
+          <p:cNvPr id="5" name="Espace réservé du contenu 4">
+            <a:extLst>
+              <a:ext uri="{FF2B5EF4-FFF2-40B4-BE49-F238E27FC236}">
+                <a16:creationId xmlns:a16="http://schemas.microsoft.com/office/drawing/2014/main" id="{C2C1A606-8C28-4E8C-82A6-EBDAF3491FFD}"/>
+              </a:ext>
+            </a:extLst>
+          </p:cNvPr>
+          <p:cNvSpPr>
+            <a:spLocks noGrp="1"/>
+          </p:cNvSpPr>
+          <p:nvPr>
+            <p:ph idx="1"/>
+          </p:nvPr>
+        </p:nvSpPr>
+        <p:spPr>
+          <a:xfrm>
+            <a:off x="4124325" y="457200"/>
+            <a:ext cx="7762875" cy="5799257"/>
+          </a:xfrm>
+        </p:spPr>
+        <p:txBody>
+          <a:bodyPr>
+            <a:normAutofit/>
+          </a:bodyPr>
+          <a:lstStyle/>
+          <a:p>
+            <a:pPr marL="0" indent="0">
+              <a:buNone/>
+            </a:pPr>
+            <a:r>
+              <a:rPr lang="fr-FR" sz="2400" b="1" dirty="0">
+                <a:solidFill>
+                  <a:schemeClr val="bg1"/>
+                </a:solidFill>
+              </a:rPr>
+              <a:t>Git Flow:</a:t>
+            </a:r>
+          </a:p>
+          <a:p>
+            <a:pPr marL="0" indent="0">
+              <a:buNone/>
+            </a:pPr>
+            <a:r>
+              <a:rPr lang="fr-FR" sz="1800" dirty="0">
+                <a:solidFill>
+                  <a:schemeClr val="bg1"/>
+                </a:solidFill>
+              </a:rPr>
+              <a:t>La gestion des version à été réalisé avec Git Flow.</a:t>
+            </a:r>
+          </a:p>
+          <a:p>
+            <a:pPr marL="0" indent="0">
+              <a:buNone/>
+            </a:pPr>
+            <a:endParaRPr lang="fr-FR" sz="1800" dirty="0">
+              <a:solidFill>
+                <a:schemeClr val="bg1"/>
+              </a:solidFill>
+            </a:endParaRPr>
+          </a:p>
+        </p:txBody>
+      </p:sp>
+      <p:sp>
+        <p:nvSpPr>
+          <p:cNvPr id="6" name="Espace réservé du texte 5">
+            <a:extLst>
+              <a:ext uri="{FF2B5EF4-FFF2-40B4-BE49-F238E27FC236}">
+                <a16:creationId xmlns:a16="http://schemas.microsoft.com/office/drawing/2014/main" id="{E6588C85-C481-4F49-8BE8-8C6C0DB13B22}"/>
+              </a:ext>
+            </a:extLst>
+          </p:cNvPr>
+          <p:cNvSpPr>
+            <a:spLocks noGrp="1"/>
+          </p:cNvSpPr>
+          <p:nvPr>
+            <p:ph type="body" sz="half" idx="2"/>
+          </p:nvPr>
+        </p:nvSpPr>
+        <p:spPr>
+          <a:xfrm>
+            <a:off x="839789" y="995363"/>
+            <a:ext cx="3085230" cy="4896479"/>
+          </a:xfrm>
+        </p:spPr>
+        <p:txBody>
+          <a:bodyPr/>
+          <a:lstStyle/>
+          <a:p>
+            <a:endParaRPr lang="fr-FR" dirty="0">
+              <a:solidFill>
+                <a:schemeClr val="bg1"/>
+              </a:solidFill>
+            </a:endParaRPr>
+          </a:p>
+          <a:p>
+            <a:pPr marL="285750" indent="-285750">
+              <a:buFont typeface="Arial" panose="020B0604020202020204" pitchFamily="34" charset="0"/>
+              <a:buChar char="•"/>
+            </a:pPr>
+            <a:r>
+              <a:rPr lang="fr-FR" dirty="0">
+                <a:solidFill>
+                  <a:schemeClr val="bg1"/>
+                </a:solidFill>
+              </a:rPr>
+              <a:t>Analyse du code existant / Identification des problèmes.</a:t>
+            </a:r>
+          </a:p>
+          <a:p>
+            <a:pPr marL="285750" indent="-285750">
+              <a:buFont typeface="Arial" panose="020B0604020202020204" pitchFamily="34" charset="0"/>
+              <a:buChar char="•"/>
+            </a:pPr>
+            <a:r>
+              <a:rPr lang="fr-FR" dirty="0">
+                <a:solidFill>
+                  <a:schemeClr val="bg1"/>
+                </a:solidFill>
+              </a:rPr>
+              <a:t>Restructuration et correction du code.</a:t>
+            </a:r>
+          </a:p>
+          <a:p>
+            <a:pPr marL="285750" indent="-285750">
+              <a:buFont typeface="Arial" panose="020B0604020202020204" pitchFamily="34" charset="0"/>
+              <a:buChar char="•"/>
+            </a:pPr>
+            <a:r>
+              <a:rPr lang="fr-FR" dirty="0">
+                <a:solidFill>
+                  <a:schemeClr val="bg1"/>
+                </a:solidFill>
+              </a:rPr>
+              <a:t>Mise en place de la solution.</a:t>
+            </a:r>
+          </a:p>
+          <a:p>
+            <a:pPr marL="285750" indent="-285750">
+              <a:buFontTx/>
+              <a:buChar char="-"/>
+            </a:pPr>
+            <a:endParaRPr lang="fr-FR" dirty="0">
+              <a:solidFill>
+                <a:schemeClr val="bg1"/>
+              </a:solidFill>
+            </a:endParaRPr>
+          </a:p>
+        </p:txBody>
+      </p:sp>
+      <p:pic>
+        <p:nvPicPr>
+          <p:cNvPr id="2" name="Image 1">
+            <a:extLst>
+              <a:ext uri="{FF2B5EF4-FFF2-40B4-BE49-F238E27FC236}">
+                <a16:creationId xmlns:a16="http://schemas.microsoft.com/office/drawing/2014/main" id="{F29127CB-236F-4507-8B8F-2E9D8AFA47FA}"/>
+              </a:ext>
+            </a:extLst>
+          </p:cNvPr>
+          <p:cNvPicPr>
+            <a:picLocks noChangeAspect="1"/>
+          </p:cNvPicPr>
+          <p:nvPr/>
+        </p:nvPicPr>
+        <p:blipFill>
+          <a:blip r:embed="rId2"/>
+          <a:stretch>
+            <a:fillRect/>
+          </a:stretch>
+        </p:blipFill>
+        <p:spPr>
+          <a:xfrm>
+            <a:off x="89291" y="108841"/>
+            <a:ext cx="687088" cy="500286"/>
+          </a:xfrm>
+          <a:prstGeom prst="rect">
+            <a:avLst/>
+          </a:prstGeom>
+        </p:spPr>
+      </p:pic>
+    </p:spTree>
+    <p:extLst>
+      <p:ext uri="{BB962C8B-B14F-4D97-AF65-F5344CB8AC3E}">
+        <p14:creationId xmlns:p14="http://schemas.microsoft.com/office/powerpoint/2010/main" val="3290132101"/>
+      </p:ext>
+    </p:extLst>
+  </p:cSld>
+  <p:clrMapOvr>
+    <a:masterClrMapping/>
+  </p:clrMapOvr>
+</p:sld>
+</file>
+
+<file path=ppt/slides/slide9.xml><?xml version="1.0" encoding="utf-8"?>
+<p:sld xmlns:a="http://schemas.openxmlformats.org/drawingml/2006/main" xmlns:r="http://schemas.openxmlformats.org/officeDocument/2006/relationships" xmlns:p="http://schemas.openxmlformats.org/presentationml/2006/main">
+  <p:cSld>
+    <p:bg>
+      <p:bgPr>
+        <a:solidFill>
+          <a:srgbClr val="002060"/>
+        </a:solidFill>
+        <a:effectLst/>
+      </p:bgPr>
+    </p:bg>
+    <p:spTree>
+      <p:nvGrpSpPr>
+        <p:cNvPr id="1" name=""/>
+        <p:cNvGrpSpPr/>
+        <p:nvPr/>
+      </p:nvGrpSpPr>
+      <p:grpSpPr>
+        <a:xfrm>
+          <a:off x="0" y="0"/>
+          <a:ext cx="0" cy="0"/>
+          <a:chOff x="0" y="0"/>
+          <a:chExt cx="0" cy="0"/>
+        </a:xfrm>
+      </p:grpSpPr>
+      <p:sp>
+        <p:nvSpPr>
+          <p:cNvPr id="4" name="Titre 3">
+            <a:extLst>
+              <a:ext uri="{FF2B5EF4-FFF2-40B4-BE49-F238E27FC236}">
+                <a16:creationId xmlns:a16="http://schemas.microsoft.com/office/drawing/2014/main" id="{885737C7-7CA3-4287-A0C2-AC3AE3138D1F}"/>
+              </a:ext>
+            </a:extLst>
+          </p:cNvPr>
+          <p:cNvSpPr>
+            <a:spLocks noGrp="1"/>
+          </p:cNvSpPr>
+          <p:nvPr>
+            <p:ph type="title"/>
+          </p:nvPr>
+        </p:nvSpPr>
+        <p:spPr>
+          <a:xfrm>
+            <a:off x="839788" y="457200"/>
+            <a:ext cx="3932237" cy="439947"/>
+          </a:xfrm>
+        </p:spPr>
+        <p:txBody>
+          <a:bodyPr>
+            <a:normAutofit fontScale="90000"/>
+          </a:bodyPr>
+          <a:lstStyle/>
+          <a:p>
+            <a:r>
+              <a:rPr lang="fr-FR" dirty="0">
+                <a:solidFill>
+                  <a:schemeClr val="bg1"/>
+                </a:solidFill>
+              </a:rPr>
+              <a:t>HEME Biotech</a:t>
+            </a:r>
+          </a:p>
+        </p:txBody>
+      </p:sp>
+      <p:sp>
+        <p:nvSpPr>
+          <p:cNvPr id="5" name="Espace réservé du contenu 4">
+            <a:extLst>
+              <a:ext uri="{FF2B5EF4-FFF2-40B4-BE49-F238E27FC236}">
+                <a16:creationId xmlns:a16="http://schemas.microsoft.com/office/drawing/2014/main" id="{C2C1A606-8C28-4E8C-82A6-EBDAF3491FFD}"/>
+              </a:ext>
+            </a:extLst>
+          </p:cNvPr>
+          <p:cNvSpPr>
+            <a:spLocks noGrp="1"/>
+          </p:cNvSpPr>
+          <p:nvPr>
+            <p:ph idx="1"/>
+          </p:nvPr>
+        </p:nvSpPr>
+        <p:spPr>
+          <a:xfrm>
+            <a:off x="4124325" y="457200"/>
+            <a:ext cx="7762875" cy="5799257"/>
+          </a:xfrm>
+        </p:spPr>
+        <p:txBody>
+          <a:bodyPr>
+            <a:normAutofit/>
+          </a:bodyPr>
+          <a:lstStyle/>
+          <a:p>
+            <a:pPr marL="0" indent="0">
+              <a:buNone/>
+            </a:pPr>
+            <a:r>
+              <a:rPr lang="fr-FR" sz="2400" b="1" dirty="0">
+                <a:solidFill>
+                  <a:schemeClr val="bg1"/>
+                </a:solidFill>
+              </a:rPr>
+              <a:t>Problèmes </a:t>
+            </a:r>
+            <a:r>
+              <a:rPr lang="fr-FR" sz="2400" b="1" dirty="0" err="1">
+                <a:solidFill>
+                  <a:schemeClr val="bg1"/>
+                </a:solidFill>
+              </a:rPr>
+              <a:t>rencontés</a:t>
+            </a:r>
+            <a:r>
+              <a:rPr lang="fr-FR" sz="2400" b="1" dirty="0">
+                <a:solidFill>
+                  <a:schemeClr val="bg1"/>
+                </a:solidFill>
+              </a:rPr>
+              <a:t>:</a:t>
+            </a:r>
+          </a:p>
+          <a:p>
+            <a:pPr marL="0" indent="0">
+              <a:buNone/>
+            </a:pPr>
+            <a:r>
+              <a:rPr lang="fr-FR" sz="1800" dirty="0">
+                <a:solidFill>
+                  <a:schemeClr val="bg1"/>
+                </a:solidFill>
+              </a:rPr>
+              <a:t>- Le tri de la </a:t>
+            </a:r>
+            <a:r>
+              <a:rPr lang="fr-FR" sz="1800" dirty="0" err="1">
+                <a:solidFill>
+                  <a:schemeClr val="bg1"/>
+                </a:solidFill>
+              </a:rPr>
+              <a:t>map</a:t>
+            </a:r>
+            <a:r>
+              <a:rPr lang="fr-FR" sz="1800" dirty="0">
+                <a:solidFill>
+                  <a:schemeClr val="bg1"/>
+                </a:solidFill>
+              </a:rPr>
+              <a:t> : En cherchant une solution de tri des symptômes j’ai trouvé </a:t>
+            </a:r>
+            <a:r>
+              <a:rPr lang="fr-FR" sz="1800" dirty="0" err="1">
+                <a:solidFill>
+                  <a:schemeClr val="bg1"/>
+                </a:solidFill>
+              </a:rPr>
+              <a:t>TreeMap</a:t>
+            </a:r>
+            <a:r>
+              <a:rPr lang="fr-FR" sz="1800" dirty="0">
+                <a:solidFill>
+                  <a:schemeClr val="bg1"/>
+                </a:solidFill>
+              </a:rPr>
+              <a:t> dans la documentation oracle :  https://docs.oracle.com/javase/8/docs/api/java/util/Map.html</a:t>
+            </a:r>
+          </a:p>
+          <a:p>
+            <a:pPr marL="0" indent="0">
+              <a:buNone/>
+            </a:pPr>
+            <a:r>
+              <a:rPr lang="fr-FR" sz="1800" dirty="0">
+                <a:solidFill>
+                  <a:schemeClr val="bg1"/>
+                </a:solidFill>
+              </a:rPr>
+              <a:t>Try/Catch/</a:t>
+            </a:r>
+            <a:r>
+              <a:rPr lang="fr-FR" sz="1800" dirty="0" err="1">
+                <a:solidFill>
+                  <a:schemeClr val="bg1"/>
+                </a:solidFill>
+              </a:rPr>
+              <a:t>Finally</a:t>
+            </a:r>
+            <a:r>
+              <a:rPr lang="fr-FR" sz="1800" dirty="0">
+                <a:solidFill>
+                  <a:schemeClr val="bg1"/>
+                </a:solidFill>
+              </a:rPr>
+              <a:t> : Externalisation des variables pour pouvoir les mettre dans le </a:t>
+            </a:r>
+            <a:r>
+              <a:rPr lang="fr-FR" sz="1800" dirty="0" err="1">
+                <a:solidFill>
+                  <a:schemeClr val="bg1"/>
+                </a:solidFill>
+              </a:rPr>
+              <a:t>finally</a:t>
+            </a:r>
+            <a:r>
+              <a:rPr lang="fr-FR" sz="1800" dirty="0">
+                <a:solidFill>
+                  <a:schemeClr val="bg1"/>
+                </a:solidFill>
+              </a:rPr>
+              <a:t>. </a:t>
+            </a:r>
+          </a:p>
+        </p:txBody>
+      </p:sp>
+      <p:sp>
+        <p:nvSpPr>
+          <p:cNvPr id="6" name="Espace réservé du texte 5">
+            <a:extLst>
+              <a:ext uri="{FF2B5EF4-FFF2-40B4-BE49-F238E27FC236}">
+                <a16:creationId xmlns:a16="http://schemas.microsoft.com/office/drawing/2014/main" id="{E6588C85-C481-4F49-8BE8-8C6C0DB13B22}"/>
+              </a:ext>
+            </a:extLst>
+          </p:cNvPr>
+          <p:cNvSpPr>
+            <a:spLocks noGrp="1"/>
+          </p:cNvSpPr>
+          <p:nvPr>
+            <p:ph type="body" sz="half" idx="2"/>
+          </p:nvPr>
+        </p:nvSpPr>
+        <p:spPr>
+          <a:xfrm>
+            <a:off x="839789" y="995363"/>
+            <a:ext cx="3085230" cy="4896479"/>
+          </a:xfrm>
+        </p:spPr>
+        <p:txBody>
+          <a:bodyPr/>
+          <a:lstStyle/>
+          <a:p>
+            <a:endParaRPr lang="fr-FR" dirty="0">
+              <a:solidFill>
+                <a:schemeClr val="bg1"/>
+              </a:solidFill>
+            </a:endParaRPr>
+          </a:p>
+          <a:p>
+            <a:pPr marL="285750" indent="-285750">
+              <a:buFont typeface="Arial" panose="020B0604020202020204" pitchFamily="34" charset="0"/>
+              <a:buChar char="•"/>
+            </a:pPr>
+            <a:r>
+              <a:rPr lang="fr-FR" dirty="0">
+                <a:solidFill>
+                  <a:schemeClr val="bg1"/>
+                </a:solidFill>
+              </a:rPr>
+              <a:t>Analyse du code existant / Identification des problèmes.</a:t>
+            </a:r>
+          </a:p>
+          <a:p>
+            <a:pPr marL="285750" indent="-285750">
+              <a:buFont typeface="Arial" panose="020B0604020202020204" pitchFamily="34" charset="0"/>
+              <a:buChar char="•"/>
+            </a:pPr>
+            <a:r>
+              <a:rPr lang="fr-FR" dirty="0">
+                <a:solidFill>
+                  <a:schemeClr val="bg1"/>
+                </a:solidFill>
+              </a:rPr>
+              <a:t>Restructuration et correction du code.</a:t>
+            </a:r>
+          </a:p>
+          <a:p>
+            <a:pPr marL="285750" indent="-285750">
+              <a:buFont typeface="Arial" panose="020B0604020202020204" pitchFamily="34" charset="0"/>
+              <a:buChar char="•"/>
+            </a:pPr>
+            <a:r>
+              <a:rPr lang="fr-FR" dirty="0">
+                <a:solidFill>
+                  <a:schemeClr val="bg1"/>
+                </a:solidFill>
+              </a:rPr>
+              <a:t>Mise en place de la solution.</a:t>
+            </a:r>
+          </a:p>
+          <a:p>
+            <a:pPr marL="285750" indent="-285750">
+              <a:buFontTx/>
+              <a:buChar char="-"/>
+            </a:pPr>
+            <a:endParaRPr lang="fr-FR" dirty="0">
+              <a:solidFill>
+                <a:schemeClr val="bg1"/>
+              </a:solidFill>
+            </a:endParaRPr>
+          </a:p>
+        </p:txBody>
+      </p:sp>
+      <p:pic>
+        <p:nvPicPr>
+          <p:cNvPr id="2" name="Image 1">
+            <a:extLst>
+              <a:ext uri="{FF2B5EF4-FFF2-40B4-BE49-F238E27FC236}">
+                <a16:creationId xmlns:a16="http://schemas.microsoft.com/office/drawing/2014/main" id="{F29127CB-236F-4507-8B8F-2E9D8AFA47FA}"/>
+              </a:ext>
+            </a:extLst>
+          </p:cNvPr>
+          <p:cNvPicPr>
+            <a:picLocks noChangeAspect="1"/>
+          </p:cNvPicPr>
+          <p:nvPr/>
+        </p:nvPicPr>
+        <p:blipFill>
+          <a:blip r:embed="rId2"/>
+          <a:stretch>
+            <a:fillRect/>
+          </a:stretch>
+        </p:blipFill>
+        <p:spPr>
+          <a:xfrm>
+            <a:off x="89291" y="108841"/>
+            <a:ext cx="687088" cy="500286"/>
+          </a:xfrm>
+          <a:prstGeom prst="rect">
+            <a:avLst/>
+          </a:prstGeom>
+        </p:spPr>
+      </p:pic>
+    </p:spTree>
+    <p:extLst>
+      <p:ext uri="{BB962C8B-B14F-4D97-AF65-F5344CB8AC3E}">
+        <p14:creationId xmlns:p14="http://schemas.microsoft.com/office/powerpoint/2010/main" val="1833834602"/>
+      </p:ext>
+    </p:extLst>
+  </p:cSld>
+  <p:clrMapOvr>
+    <a:masterClrMapping/>
   </p:clrMapOvr>
 </p:sld>
 </file>
@@ -8844,21 +8699,6 @@
 </file>
 
 <file path=customXml/item1.xml><?xml version="1.0" encoding="utf-8"?>
-<p:properties xmlns:p="http://schemas.microsoft.com/office/2006/metadata/properties" xmlns:xsi="http://www.w3.org/2001/XMLSchema-instance" xmlns:pc="http://schemas.microsoft.com/office/infopath/2007/PartnerControls">
-  <documentManagement/>
-</p:properties>
-</file>
-
-<file path=customXml/item2.xml><?xml version="1.0" encoding="utf-8"?>
-<?mso-contentType ?>
-<FormTemplates xmlns="http://schemas.microsoft.com/sharepoint/v3/contenttype/forms">
-  <Display>DocumentLibraryForm</Display>
-  <Edit>DocumentLibraryForm</Edit>
-  <New>DocumentLibraryForm</New>
-</FormTemplates>
-</file>
-
-<file path=customXml/item3.xml><?xml version="1.0" encoding="utf-8"?>
 <ct:contentTypeSchema xmlns:ct="http://schemas.microsoft.com/office/2006/metadata/contentType" xmlns:ma="http://schemas.microsoft.com/office/2006/metadata/properties/metaAttributes" ct:_="" ma:_="" ma:contentTypeName="Document" ma:contentTypeID="0x010100202981F7C1145248A8D3907E44AE30F6" ma:contentTypeVersion="11" ma:contentTypeDescription="Create a new document." ma:contentTypeScope="" ma:versionID="9c05ca292ac8759e913fb3c569d2931d">
   <xsd:schema xmlns:xsd="http://www.w3.org/2001/XMLSchema" xmlns:xs="http://www.w3.org/2001/XMLSchema" xmlns:p="http://schemas.microsoft.com/office/2006/metadata/properties" xmlns:ns3="f741cb3e-7080-43ab-9216-5d077f961791" xmlns:ns4="9aeed0b5-fe1c-4357-9e2f-a27f5a2a43be" targetNamespace="http://schemas.microsoft.com/office/2006/metadata/properties" ma:root="true" ma:fieldsID="585a25167f1c8dfa5b2866eca0b7e8a4" ns3:_="" ns4:_="">
     <xsd:import namespace="f741cb3e-7080-43ab-9216-5d077f961791"/>
@@ -9067,24 +8907,22 @@
 </ct:contentTypeSchema>
 </file>
 
-<file path=customXml/itemProps1.xml><?xml version="1.0" encoding="utf-8"?>
-<ds:datastoreItem xmlns:ds="http://schemas.openxmlformats.org/officeDocument/2006/customXml" ds:itemID="{80BC0345-D010-4297-9C70-529EBFA67960}">
-  <ds:schemaRefs>
-    <ds:schemaRef ds:uri="http://schemas.microsoft.com/office/2006/metadata/properties"/>
-    <ds:schemaRef ds:uri="http://schemas.microsoft.com/office/infopath/2007/PartnerControls"/>
-  </ds:schemaRefs>
-</ds:datastoreItem>
+<file path=customXml/item2.xml><?xml version="1.0" encoding="utf-8"?>
+<?mso-contentType ?>
+<FormTemplates xmlns="http://schemas.microsoft.com/sharepoint/v3/contenttype/forms">
+  <Display>DocumentLibraryForm</Display>
+  <Edit>DocumentLibraryForm</Edit>
+  <New>DocumentLibraryForm</New>
+</FormTemplates>
 </file>
 
-<file path=customXml/itemProps2.xml><?xml version="1.0" encoding="utf-8"?>
-<ds:datastoreItem xmlns:ds="http://schemas.openxmlformats.org/officeDocument/2006/customXml" ds:itemID="{5CE97DEC-31C6-4560-9AD6-48685F778F5F}">
-  <ds:schemaRefs>
-    <ds:schemaRef ds:uri="http://schemas.microsoft.com/sharepoint/v3/contenttype/forms"/>
-  </ds:schemaRefs>
-</ds:datastoreItem>
+<file path=customXml/item3.xml><?xml version="1.0" encoding="utf-8"?>
+<p:properties xmlns:p="http://schemas.microsoft.com/office/2006/metadata/properties" xmlns:xsi="http://www.w3.org/2001/XMLSchema-instance" xmlns:pc="http://schemas.microsoft.com/office/infopath/2007/PartnerControls">
+  <documentManagement/>
+</p:properties>
 </file>
 
-<file path=customXml/itemProps3.xml><?xml version="1.0" encoding="utf-8"?>
+<file path=customXml/itemProps1.xml><?xml version="1.0" encoding="utf-8"?>
 <ds:datastoreItem xmlns:ds="http://schemas.openxmlformats.org/officeDocument/2006/customXml" ds:itemID="{6C356DF7-8B25-409A-86DF-B999D117D102}">
   <ds:schemaRefs>
     <ds:schemaRef ds:uri="http://schemas.microsoft.com/office/2006/metadata/contentType"/>
@@ -9101,4 +8939,21 @@
     <ds:schemaRef ds:uri="http://schemas.microsoft.com/internal/obd"/>
   </ds:schemaRefs>
 </ds:datastoreItem>
+</file>
+
+<file path=customXml/itemProps2.xml><?xml version="1.0" encoding="utf-8"?>
+<ds:datastoreItem xmlns:ds="http://schemas.openxmlformats.org/officeDocument/2006/customXml" ds:itemID="{5CE97DEC-31C6-4560-9AD6-48685F778F5F}">
+  <ds:schemaRefs>
+    <ds:schemaRef ds:uri="http://schemas.microsoft.com/sharepoint/v3/contenttype/forms"/>
+  </ds:schemaRefs>
+</ds:datastoreItem>
+</file>
+
+<file path=customXml/itemProps3.xml><?xml version="1.0" encoding="utf-8"?>
+<ds:datastoreItem xmlns:ds="http://schemas.openxmlformats.org/officeDocument/2006/customXml" ds:itemID="{80BC0345-D010-4297-9C70-529EBFA67960}">
+  <ds:schemaRefs>
+    <ds:schemaRef ds:uri="http://schemas.microsoft.com/office/2006/metadata/properties"/>
+    <ds:schemaRef ds:uri="http://schemas.microsoft.com/office/infopath/2007/PartnerControls"/>
+  </ds:schemaRefs>
+</ds:datastoreItem>
 </file>
</xml_diff>